<commit_message>
Apresentação e Limpeza do código
</commit_message>
<xml_diff>
--- a/Apresentação/Deslize.pptx
+++ b/Apresentação/Deslize.pptx
@@ -7068,6 +7068,1212 @@
           </p:txBody>
         </p:sp>
       </p:grpSp>
+      <p:sp>
+        <p:nvSpPr>
+          <p:cNvPr id="4" name="Retângulo 3"/>
+          <p:cNvSpPr/>
+          <p:nvPr/>
+        </p:nvSpPr>
+        <p:spPr>
+          <a:xfrm>
+            <a:off x="5384088" y="188221"/>
+            <a:ext cx="6760874" cy="6581289"/>
+          </a:xfrm>
+          <a:prstGeom prst="rect">
+            <a:avLst/>
+          </a:prstGeom>
+        </p:spPr>
+        <p:txBody>
+          <a:bodyPr wrap="square">
+            <a:spAutoFit/>
+          </a:bodyPr>
+          <a:lstStyle/>
+          <a:p>
+            <a:pPr>
+              <a:lnSpc>
+                <a:spcPts val="2200"/>
+              </a:lnSpc>
+            </a:pPr>
+            <a:r>
+              <a:rPr lang="pt-BR" sz="1600" b="1" dirty="0" err="1">
+                <a:solidFill>
+                  <a:schemeClr val="accent1"/>
+                </a:solidFill>
+                <a:latin typeface="Courier New" panose="02070309020205020404" pitchFamily="49" charset="0"/>
+                <a:cs typeface="Courier New" panose="02070309020205020404" pitchFamily="49" charset="0"/>
+              </a:rPr>
+              <a:t>function</a:t>
+            </a:r>
+            <a:r>
+              <a:rPr lang="pt-BR" sz="1600" dirty="0">
+                <a:solidFill>
+                  <a:schemeClr val="accent1"/>
+                </a:solidFill>
+                <a:latin typeface="Courier New" panose="02070309020205020404" pitchFamily="49" charset="0"/>
+                <a:cs typeface="Courier New" panose="02070309020205020404" pitchFamily="49" charset="0"/>
+              </a:rPr>
+              <a:t> </a:t>
+            </a:r>
+            <a:r>
+              <a:rPr lang="pt-BR" sz="1600" u="sng" dirty="0" err="1" smtClean="0">
+                <a:latin typeface="Courier New" panose="02070309020205020404" pitchFamily="49" charset="0"/>
+                <a:cs typeface="Courier New" panose="02070309020205020404" pitchFamily="49" charset="0"/>
+              </a:rPr>
+              <a:t>gera_quads</a:t>
+            </a:r>
+            <a:r>
+              <a:rPr lang="pt-BR" sz="1600" dirty="0" smtClean="0">
+                <a:latin typeface="Courier New" panose="02070309020205020404" pitchFamily="49" charset="0"/>
+                <a:cs typeface="Courier New" panose="02070309020205020404" pitchFamily="49" charset="0"/>
+              </a:rPr>
+              <a:t>() </a:t>
+            </a:r>
+            <a:r>
+              <a:rPr lang="pt-BR" sz="1600" dirty="0">
+                <a:latin typeface="Courier New" panose="02070309020205020404" pitchFamily="49" charset="0"/>
+                <a:cs typeface="Courier New" panose="02070309020205020404" pitchFamily="49" charset="0"/>
+              </a:rPr>
+              <a:t>-</a:t>
+            </a:r>
+            <a:r>
+              <a:rPr lang="pt-BR" sz="1600" dirty="0" smtClean="0">
+                <a:latin typeface="Courier New" panose="02070309020205020404" pitchFamily="49" charset="0"/>
+                <a:cs typeface="Courier New" panose="02070309020205020404" pitchFamily="49" charset="0"/>
+              </a:rPr>
+              <a:t>-exemplo com dificuldade 3</a:t>
+            </a:r>
+            <a:endParaRPr lang="pt-BR" sz="1600" dirty="0">
+              <a:latin typeface="Courier New" panose="02070309020205020404" pitchFamily="49" charset="0"/>
+              <a:cs typeface="Courier New" panose="02070309020205020404" pitchFamily="49" charset="0"/>
+            </a:endParaRPr>
+          </a:p>
+          <a:p>
+            <a:pPr>
+              <a:lnSpc>
+                <a:spcPts val="2200"/>
+              </a:lnSpc>
+            </a:pPr>
+            <a:r>
+              <a:rPr lang="pt-BR" sz="1600" dirty="0" smtClean="0">
+                <a:latin typeface="Courier New" panose="02070309020205020404" pitchFamily="49" charset="0"/>
+                <a:cs typeface="Courier New" panose="02070309020205020404" pitchFamily="49" charset="0"/>
+              </a:rPr>
+              <a:t>  </a:t>
+            </a:r>
+            <a:r>
+              <a:rPr lang="pt-BR" sz="1600" dirty="0" err="1" smtClean="0">
+                <a:latin typeface="Courier New" panose="02070309020205020404" pitchFamily="49" charset="0"/>
+                <a:cs typeface="Courier New" panose="02070309020205020404" pitchFamily="49" charset="0"/>
+              </a:rPr>
+              <a:t>qnt_tiles</a:t>
+            </a:r>
+            <a:r>
+              <a:rPr lang="pt-BR" sz="1600" dirty="0" smtClean="0">
+                <a:latin typeface="Courier New" panose="02070309020205020404" pitchFamily="49" charset="0"/>
+                <a:cs typeface="Courier New" panose="02070309020205020404" pitchFamily="49" charset="0"/>
+              </a:rPr>
+              <a:t> </a:t>
+            </a:r>
+            <a:r>
+              <a:rPr lang="pt-BR" sz="1600" dirty="0">
+                <a:latin typeface="Courier New" panose="02070309020205020404" pitchFamily="49" charset="0"/>
+                <a:cs typeface="Courier New" panose="02070309020205020404" pitchFamily="49" charset="0"/>
+              </a:rPr>
+              <a:t>= dificuldade * </a:t>
+            </a:r>
+            <a:r>
+              <a:rPr lang="pt-BR" sz="1600" dirty="0" smtClean="0">
+                <a:latin typeface="Courier New" panose="02070309020205020404" pitchFamily="49" charset="0"/>
+                <a:cs typeface="Courier New" panose="02070309020205020404" pitchFamily="49" charset="0"/>
+              </a:rPr>
+              <a:t>dificuldade</a:t>
+            </a:r>
+            <a:endParaRPr lang="pt-BR" sz="1600" dirty="0">
+              <a:latin typeface="Courier New" panose="02070309020205020404" pitchFamily="49" charset="0"/>
+              <a:cs typeface="Courier New" panose="02070309020205020404" pitchFamily="49" charset="0"/>
+            </a:endParaRPr>
+          </a:p>
+          <a:p>
+            <a:pPr>
+              <a:lnSpc>
+                <a:spcPts val="2200"/>
+              </a:lnSpc>
+            </a:pPr>
+            <a:r>
+              <a:rPr lang="pt-BR" sz="1600" dirty="0" smtClean="0">
+                <a:latin typeface="Courier New" panose="02070309020205020404" pitchFamily="49" charset="0"/>
+                <a:cs typeface="Courier New" panose="02070309020205020404" pitchFamily="49" charset="0"/>
+              </a:rPr>
+              <a:t>  </a:t>
+            </a:r>
+            <a:r>
+              <a:rPr lang="pt-BR" sz="1600" dirty="0" err="1">
+                <a:latin typeface="Courier New" panose="02070309020205020404" pitchFamily="49" charset="0"/>
+                <a:cs typeface="Courier New" panose="02070309020205020404" pitchFamily="49" charset="0"/>
+              </a:rPr>
+              <a:t>tamanho_tile</a:t>
+            </a:r>
+            <a:r>
+              <a:rPr lang="pt-BR" sz="1600" dirty="0">
+                <a:latin typeface="Courier New" panose="02070309020205020404" pitchFamily="49" charset="0"/>
+                <a:cs typeface="Courier New" panose="02070309020205020404" pitchFamily="49" charset="0"/>
+              </a:rPr>
+              <a:t> = </a:t>
+            </a:r>
+            <a:r>
+              <a:rPr lang="pt-BR" sz="1600" dirty="0" smtClean="0">
+                <a:solidFill>
+                  <a:schemeClr val="accent2"/>
+                </a:solidFill>
+                <a:latin typeface="Courier New" panose="02070309020205020404" pitchFamily="49" charset="0"/>
+                <a:cs typeface="Courier New" panose="02070309020205020404" pitchFamily="49" charset="0"/>
+              </a:rPr>
+              <a:t>900</a:t>
+            </a:r>
+            <a:r>
+              <a:rPr lang="pt-BR" sz="1600" dirty="0" smtClean="0">
+                <a:latin typeface="Courier New" panose="02070309020205020404" pitchFamily="49" charset="0"/>
+                <a:cs typeface="Courier New" panose="02070309020205020404" pitchFamily="49" charset="0"/>
+              </a:rPr>
+              <a:t>/dificuldade</a:t>
+            </a:r>
+            <a:endParaRPr lang="pt-BR" sz="1600" dirty="0">
+              <a:latin typeface="Courier New" panose="02070309020205020404" pitchFamily="49" charset="0"/>
+              <a:cs typeface="Courier New" panose="02070309020205020404" pitchFamily="49" charset="0"/>
+            </a:endParaRPr>
+          </a:p>
+          <a:p>
+            <a:pPr>
+              <a:lnSpc>
+                <a:spcPts val="2200"/>
+              </a:lnSpc>
+            </a:pPr>
+            <a:r>
+              <a:rPr lang="pt-BR" sz="1600" dirty="0" smtClean="0">
+                <a:latin typeface="Courier New" panose="02070309020205020404" pitchFamily="49" charset="0"/>
+                <a:cs typeface="Courier New" panose="02070309020205020404" pitchFamily="49" charset="0"/>
+              </a:rPr>
+              <a:t>  </a:t>
+            </a:r>
+            <a:r>
+              <a:rPr lang="pt-BR" sz="1600" b="1" dirty="0">
+                <a:solidFill>
+                  <a:schemeClr val="accent1"/>
+                </a:solidFill>
+                <a:latin typeface="Courier New" panose="02070309020205020404" pitchFamily="49" charset="0"/>
+                <a:cs typeface="Courier New" panose="02070309020205020404" pitchFamily="49" charset="0"/>
+              </a:rPr>
+              <a:t>local</a:t>
+            </a:r>
+            <a:r>
+              <a:rPr lang="pt-BR" sz="1600" dirty="0">
+                <a:solidFill>
+                  <a:schemeClr val="accent1"/>
+                </a:solidFill>
+                <a:latin typeface="Courier New" panose="02070309020205020404" pitchFamily="49" charset="0"/>
+                <a:cs typeface="Courier New" panose="02070309020205020404" pitchFamily="49" charset="0"/>
+              </a:rPr>
+              <a:t> </a:t>
+            </a:r>
+            <a:r>
+              <a:rPr lang="pt-BR" sz="1600" dirty="0">
+                <a:latin typeface="Courier New" panose="02070309020205020404" pitchFamily="49" charset="0"/>
+                <a:cs typeface="Courier New" panose="02070309020205020404" pitchFamily="49" charset="0"/>
+              </a:rPr>
+              <a:t>x = </a:t>
+            </a:r>
+            <a:r>
+              <a:rPr lang="pt-BR" sz="1600" dirty="0">
+                <a:solidFill>
+                  <a:schemeClr val="accent2"/>
+                </a:solidFill>
+                <a:latin typeface="Courier New" panose="02070309020205020404" pitchFamily="49" charset="0"/>
+                <a:cs typeface="Courier New" panose="02070309020205020404" pitchFamily="49" charset="0"/>
+              </a:rPr>
+              <a:t>0</a:t>
+            </a:r>
+          </a:p>
+          <a:p>
+            <a:pPr>
+              <a:lnSpc>
+                <a:spcPts val="2200"/>
+              </a:lnSpc>
+            </a:pPr>
+            <a:r>
+              <a:rPr lang="pt-BR" sz="1600" dirty="0" smtClean="0">
+                <a:latin typeface="Courier New" panose="02070309020205020404" pitchFamily="49" charset="0"/>
+                <a:cs typeface="Courier New" panose="02070309020205020404" pitchFamily="49" charset="0"/>
+              </a:rPr>
+              <a:t>  </a:t>
+            </a:r>
+            <a:r>
+              <a:rPr lang="pt-BR" sz="1600" b="1" dirty="0">
+                <a:solidFill>
+                  <a:schemeClr val="accent1"/>
+                </a:solidFill>
+                <a:latin typeface="Courier New" panose="02070309020205020404" pitchFamily="49" charset="0"/>
+                <a:cs typeface="Courier New" panose="02070309020205020404" pitchFamily="49" charset="0"/>
+              </a:rPr>
+              <a:t>local</a:t>
+            </a:r>
+            <a:r>
+              <a:rPr lang="pt-BR" sz="1600" dirty="0">
+                <a:solidFill>
+                  <a:schemeClr val="accent1"/>
+                </a:solidFill>
+                <a:latin typeface="Courier New" panose="02070309020205020404" pitchFamily="49" charset="0"/>
+                <a:cs typeface="Courier New" panose="02070309020205020404" pitchFamily="49" charset="0"/>
+              </a:rPr>
+              <a:t> </a:t>
+            </a:r>
+            <a:r>
+              <a:rPr lang="pt-BR" sz="1600" dirty="0">
+                <a:latin typeface="Courier New" panose="02070309020205020404" pitchFamily="49" charset="0"/>
+                <a:cs typeface="Courier New" panose="02070309020205020404" pitchFamily="49" charset="0"/>
+              </a:rPr>
+              <a:t>y = </a:t>
+            </a:r>
+            <a:r>
+              <a:rPr lang="pt-BR" sz="1600" dirty="0">
+                <a:solidFill>
+                  <a:schemeClr val="accent2"/>
+                </a:solidFill>
+                <a:latin typeface="Courier New" panose="02070309020205020404" pitchFamily="49" charset="0"/>
+                <a:cs typeface="Courier New" panose="02070309020205020404" pitchFamily="49" charset="0"/>
+              </a:rPr>
+              <a:t>0</a:t>
+            </a:r>
+          </a:p>
+          <a:p>
+            <a:pPr>
+              <a:lnSpc>
+                <a:spcPts val="2200"/>
+              </a:lnSpc>
+            </a:pPr>
+            <a:r>
+              <a:rPr lang="pt-BR" sz="1600" dirty="0" smtClean="0">
+                <a:latin typeface="Courier New" panose="02070309020205020404" pitchFamily="49" charset="0"/>
+                <a:cs typeface="Courier New" panose="02070309020205020404" pitchFamily="49" charset="0"/>
+              </a:rPr>
+              <a:t>  tiles </a:t>
+            </a:r>
+            <a:r>
+              <a:rPr lang="pt-BR" sz="1600" dirty="0">
+                <a:latin typeface="Courier New" panose="02070309020205020404" pitchFamily="49" charset="0"/>
+                <a:cs typeface="Courier New" panose="02070309020205020404" pitchFamily="49" charset="0"/>
+              </a:rPr>
+              <a:t>= {}</a:t>
+            </a:r>
+          </a:p>
+          <a:p>
+            <a:pPr>
+              <a:lnSpc>
+                <a:spcPts val="2200"/>
+              </a:lnSpc>
+            </a:pPr>
+            <a:r>
+              <a:rPr lang="pt-BR" sz="1600" dirty="0" smtClean="0">
+                <a:latin typeface="Courier New" panose="02070309020205020404" pitchFamily="49" charset="0"/>
+                <a:cs typeface="Courier New" panose="02070309020205020404" pitchFamily="49" charset="0"/>
+              </a:rPr>
+              <a:t>  </a:t>
+            </a:r>
+            <a:r>
+              <a:rPr lang="pt-BR" sz="1600" b="1" dirty="0">
+                <a:solidFill>
+                  <a:schemeClr val="accent1"/>
+                </a:solidFill>
+                <a:latin typeface="Courier New" panose="02070309020205020404" pitchFamily="49" charset="0"/>
+                <a:cs typeface="Courier New" panose="02070309020205020404" pitchFamily="49" charset="0"/>
+              </a:rPr>
+              <a:t>for</a:t>
+            </a:r>
+            <a:r>
+              <a:rPr lang="pt-BR" sz="1600" dirty="0">
+                <a:solidFill>
+                  <a:schemeClr val="accent1"/>
+                </a:solidFill>
+                <a:latin typeface="Courier New" panose="02070309020205020404" pitchFamily="49" charset="0"/>
+                <a:cs typeface="Courier New" panose="02070309020205020404" pitchFamily="49" charset="0"/>
+              </a:rPr>
+              <a:t> </a:t>
+            </a:r>
+            <a:r>
+              <a:rPr lang="pt-BR" sz="1600" dirty="0">
+                <a:latin typeface="Courier New" panose="02070309020205020404" pitchFamily="49" charset="0"/>
+                <a:cs typeface="Courier New" panose="02070309020205020404" pitchFamily="49" charset="0"/>
+              </a:rPr>
+              <a:t>i=</a:t>
+            </a:r>
+            <a:r>
+              <a:rPr lang="pt-BR" sz="1600" dirty="0">
+                <a:solidFill>
+                  <a:schemeClr val="accent2"/>
+                </a:solidFill>
+                <a:latin typeface="Courier New" panose="02070309020205020404" pitchFamily="49" charset="0"/>
+                <a:cs typeface="Courier New" panose="02070309020205020404" pitchFamily="49" charset="0"/>
+              </a:rPr>
+              <a:t>1</a:t>
+            </a:r>
+            <a:r>
+              <a:rPr lang="pt-BR" sz="1600" dirty="0">
+                <a:latin typeface="Courier New" panose="02070309020205020404" pitchFamily="49" charset="0"/>
+                <a:cs typeface="Courier New" panose="02070309020205020404" pitchFamily="49" charset="0"/>
+              </a:rPr>
+              <a:t>, </a:t>
+            </a:r>
+            <a:r>
+              <a:rPr lang="pt-BR" sz="1600" dirty="0" err="1">
+                <a:latin typeface="Courier New" panose="02070309020205020404" pitchFamily="49" charset="0"/>
+                <a:cs typeface="Courier New" panose="02070309020205020404" pitchFamily="49" charset="0"/>
+              </a:rPr>
+              <a:t>qnt_tiles</a:t>
+            </a:r>
+            <a:r>
+              <a:rPr lang="pt-BR" sz="1600" dirty="0">
+                <a:latin typeface="Courier New" panose="02070309020205020404" pitchFamily="49" charset="0"/>
+                <a:cs typeface="Courier New" panose="02070309020205020404" pitchFamily="49" charset="0"/>
+              </a:rPr>
+              <a:t> </a:t>
+            </a:r>
+            <a:r>
+              <a:rPr lang="pt-BR" sz="1600" b="1" dirty="0">
+                <a:solidFill>
+                  <a:schemeClr val="accent1"/>
+                </a:solidFill>
+                <a:latin typeface="Courier New" panose="02070309020205020404" pitchFamily="49" charset="0"/>
+                <a:cs typeface="Courier New" panose="02070309020205020404" pitchFamily="49" charset="0"/>
+              </a:rPr>
+              <a:t>do</a:t>
+            </a:r>
+          </a:p>
+          <a:p>
+            <a:pPr>
+              <a:lnSpc>
+                <a:spcPts val="2200"/>
+              </a:lnSpc>
+            </a:pPr>
+            <a:r>
+              <a:rPr lang="pt-BR" sz="1600" dirty="0" smtClean="0">
+                <a:latin typeface="Courier New" panose="02070309020205020404" pitchFamily="49" charset="0"/>
+                <a:cs typeface="Courier New" panose="02070309020205020404" pitchFamily="49" charset="0"/>
+              </a:rPr>
+              <a:t>    </a:t>
+            </a:r>
+            <a:r>
+              <a:rPr lang="pt-BR" sz="1600" b="1" dirty="0" smtClean="0">
+                <a:solidFill>
+                  <a:schemeClr val="accent1"/>
+                </a:solidFill>
+                <a:latin typeface="Courier New" panose="02070309020205020404" pitchFamily="49" charset="0"/>
+                <a:cs typeface="Courier New" panose="02070309020205020404" pitchFamily="49" charset="0"/>
+              </a:rPr>
+              <a:t>local</a:t>
+            </a:r>
+            <a:r>
+              <a:rPr lang="pt-BR" sz="1600" dirty="0" smtClean="0">
+                <a:solidFill>
+                  <a:schemeClr val="accent1"/>
+                </a:solidFill>
+                <a:latin typeface="Courier New" panose="02070309020205020404" pitchFamily="49" charset="0"/>
+                <a:cs typeface="Courier New" panose="02070309020205020404" pitchFamily="49" charset="0"/>
+              </a:rPr>
+              <a:t> </a:t>
+            </a:r>
+            <a:r>
+              <a:rPr lang="pt-BR" sz="1600" dirty="0" err="1" smtClean="0">
+                <a:latin typeface="Courier New" panose="02070309020205020404" pitchFamily="49" charset="0"/>
+                <a:cs typeface="Courier New" panose="02070309020205020404" pitchFamily="49" charset="0"/>
+              </a:rPr>
+              <a:t>tile_atual</a:t>
+            </a:r>
+            <a:r>
+              <a:rPr lang="pt-BR" sz="1600" dirty="0" smtClean="0">
+                <a:latin typeface="Courier New" panose="02070309020205020404" pitchFamily="49" charset="0"/>
+                <a:cs typeface="Courier New" panose="02070309020205020404" pitchFamily="49" charset="0"/>
+              </a:rPr>
+              <a:t> = </a:t>
+            </a:r>
+            <a:r>
+              <a:rPr lang="pt-BR" sz="1600" dirty="0" err="1" smtClean="0">
+                <a:latin typeface="Courier New" panose="02070309020205020404" pitchFamily="49" charset="0"/>
+                <a:cs typeface="Courier New" panose="02070309020205020404" pitchFamily="49" charset="0"/>
+              </a:rPr>
+              <a:t>love.graphics.newQuad</a:t>
+            </a:r>
+            <a:r>
+              <a:rPr lang="pt-BR" sz="1600" dirty="0" smtClean="0">
+                <a:latin typeface="Courier New" panose="02070309020205020404" pitchFamily="49" charset="0"/>
+                <a:cs typeface="Courier New" panose="02070309020205020404" pitchFamily="49" charset="0"/>
+              </a:rPr>
+              <a:t>(</a:t>
+            </a:r>
+          </a:p>
+          <a:p>
+            <a:pPr>
+              <a:lnSpc>
+                <a:spcPts val="2200"/>
+              </a:lnSpc>
+            </a:pPr>
+            <a:r>
+              <a:rPr lang="pt-BR" sz="1600" dirty="0">
+                <a:latin typeface="Courier New" panose="02070309020205020404" pitchFamily="49" charset="0"/>
+                <a:cs typeface="Courier New" panose="02070309020205020404" pitchFamily="49" charset="0"/>
+              </a:rPr>
+              <a:t> </a:t>
+            </a:r>
+            <a:r>
+              <a:rPr lang="pt-BR" sz="1600" dirty="0" smtClean="0">
+                <a:latin typeface="Courier New" panose="02070309020205020404" pitchFamily="49" charset="0"/>
+                <a:cs typeface="Courier New" panose="02070309020205020404" pitchFamily="49" charset="0"/>
+              </a:rPr>
+              <a:t>         x, y, </a:t>
+            </a:r>
+            <a:r>
+              <a:rPr lang="pt-BR" sz="1600" dirty="0" err="1" smtClean="0">
+                <a:latin typeface="Courier New" panose="02070309020205020404" pitchFamily="49" charset="0"/>
+                <a:cs typeface="Courier New" panose="02070309020205020404" pitchFamily="49" charset="0"/>
+              </a:rPr>
+              <a:t>tam_tile</a:t>
+            </a:r>
+            <a:r>
+              <a:rPr lang="pt-BR" sz="1600" dirty="0" smtClean="0">
+                <a:latin typeface="Courier New" panose="02070309020205020404" pitchFamily="49" charset="0"/>
+                <a:cs typeface="Courier New" panose="02070309020205020404" pitchFamily="49" charset="0"/>
+              </a:rPr>
+              <a:t>, </a:t>
+            </a:r>
+            <a:r>
+              <a:rPr lang="pt-BR" sz="1600" dirty="0" err="1" smtClean="0">
+                <a:latin typeface="Courier New" panose="02070309020205020404" pitchFamily="49" charset="0"/>
+                <a:cs typeface="Courier New" panose="02070309020205020404" pitchFamily="49" charset="0"/>
+              </a:rPr>
+              <a:t>tam_tile</a:t>
+            </a:r>
+            <a:r>
+              <a:rPr lang="pt-BR" sz="1600" dirty="0" smtClean="0">
+                <a:latin typeface="Courier New" panose="02070309020205020404" pitchFamily="49" charset="0"/>
+                <a:cs typeface="Courier New" panose="02070309020205020404" pitchFamily="49" charset="0"/>
+              </a:rPr>
+              <a:t>, </a:t>
+            </a:r>
+            <a:r>
+              <a:rPr lang="pt-BR" sz="1600" dirty="0" smtClean="0">
+                <a:solidFill>
+                  <a:schemeClr val="accent2"/>
+                </a:solidFill>
+                <a:latin typeface="Courier New" panose="02070309020205020404" pitchFamily="49" charset="0"/>
+                <a:cs typeface="Courier New" panose="02070309020205020404" pitchFamily="49" charset="0"/>
+              </a:rPr>
+              <a:t>900</a:t>
+            </a:r>
+            <a:r>
+              <a:rPr lang="pt-BR" sz="1600" dirty="0" smtClean="0">
+                <a:latin typeface="Courier New" panose="02070309020205020404" pitchFamily="49" charset="0"/>
+                <a:cs typeface="Courier New" panose="02070309020205020404" pitchFamily="49" charset="0"/>
+              </a:rPr>
+              <a:t>, </a:t>
+            </a:r>
+            <a:r>
+              <a:rPr lang="pt-BR" sz="1600" dirty="0" smtClean="0">
+                <a:solidFill>
+                  <a:schemeClr val="accent2"/>
+                </a:solidFill>
+                <a:latin typeface="Courier New" panose="02070309020205020404" pitchFamily="49" charset="0"/>
+                <a:cs typeface="Courier New" panose="02070309020205020404" pitchFamily="49" charset="0"/>
+              </a:rPr>
+              <a:t>900</a:t>
+            </a:r>
+            <a:r>
+              <a:rPr lang="pt-BR" sz="1600" dirty="0">
+                <a:latin typeface="Courier New" panose="02070309020205020404" pitchFamily="49" charset="0"/>
+                <a:cs typeface="Courier New" panose="02070309020205020404" pitchFamily="49" charset="0"/>
+              </a:rPr>
+              <a:t>)</a:t>
+            </a:r>
+          </a:p>
+          <a:p>
+            <a:pPr>
+              <a:lnSpc>
+                <a:spcPts val="2200"/>
+              </a:lnSpc>
+            </a:pPr>
+            <a:r>
+              <a:rPr lang="pt-BR" sz="1600" dirty="0" smtClean="0">
+                <a:latin typeface="Courier New" panose="02070309020205020404" pitchFamily="49" charset="0"/>
+                <a:cs typeface="Courier New" panose="02070309020205020404" pitchFamily="49" charset="0"/>
+              </a:rPr>
+              <a:t>    tiles</a:t>
+            </a:r>
+            <a:r>
+              <a:rPr lang="pt-BR" sz="1600" dirty="0">
+                <a:latin typeface="Courier New" panose="02070309020205020404" pitchFamily="49" charset="0"/>
+                <a:cs typeface="Courier New" panose="02070309020205020404" pitchFamily="49" charset="0"/>
+              </a:rPr>
+              <a:t>[#tiles+</a:t>
+            </a:r>
+            <a:r>
+              <a:rPr lang="pt-BR" sz="1600" dirty="0">
+                <a:solidFill>
+                  <a:schemeClr val="accent2"/>
+                </a:solidFill>
+                <a:latin typeface="Courier New" panose="02070309020205020404" pitchFamily="49" charset="0"/>
+                <a:cs typeface="Courier New" panose="02070309020205020404" pitchFamily="49" charset="0"/>
+              </a:rPr>
+              <a:t>1</a:t>
+            </a:r>
+            <a:r>
+              <a:rPr lang="pt-BR" sz="1600" dirty="0">
+                <a:latin typeface="Courier New" panose="02070309020205020404" pitchFamily="49" charset="0"/>
+                <a:cs typeface="Courier New" panose="02070309020205020404" pitchFamily="49" charset="0"/>
+              </a:rPr>
+              <a:t>] = </a:t>
+            </a:r>
+            <a:r>
+              <a:rPr lang="pt-BR" sz="1600" dirty="0" smtClean="0">
+                <a:latin typeface="Courier New" panose="02070309020205020404" pitchFamily="49" charset="0"/>
+                <a:cs typeface="Courier New" panose="02070309020205020404" pitchFamily="49" charset="0"/>
+              </a:rPr>
+              <a:t>{index </a:t>
+            </a:r>
+            <a:r>
+              <a:rPr lang="pt-BR" sz="1600" dirty="0">
+                <a:latin typeface="Courier New" panose="02070309020205020404" pitchFamily="49" charset="0"/>
+                <a:cs typeface="Courier New" panose="02070309020205020404" pitchFamily="49" charset="0"/>
+              </a:rPr>
+              <a:t>= </a:t>
+            </a:r>
+            <a:r>
+              <a:rPr lang="pt-BR" sz="1600" dirty="0" smtClean="0">
+                <a:latin typeface="Courier New" panose="02070309020205020404" pitchFamily="49" charset="0"/>
+                <a:cs typeface="Courier New" panose="02070309020205020404" pitchFamily="49" charset="0"/>
+              </a:rPr>
+              <a:t>i,</a:t>
+            </a:r>
+          </a:p>
+          <a:p>
+            <a:pPr>
+              <a:lnSpc>
+                <a:spcPts val="2200"/>
+              </a:lnSpc>
+            </a:pPr>
+            <a:r>
+              <a:rPr lang="pt-BR" sz="1600" dirty="0">
+                <a:latin typeface="Courier New" panose="02070309020205020404" pitchFamily="49" charset="0"/>
+                <a:cs typeface="Courier New" panose="02070309020205020404" pitchFamily="49" charset="0"/>
+              </a:rPr>
+              <a:t> </a:t>
+            </a:r>
+            <a:r>
+              <a:rPr lang="pt-BR" sz="1600" dirty="0" smtClean="0">
+                <a:latin typeface="Courier New" panose="02070309020205020404" pitchFamily="49" charset="0"/>
+                <a:cs typeface="Courier New" panose="02070309020205020404" pitchFamily="49" charset="0"/>
+              </a:rPr>
+              <a:t>                      </a:t>
+            </a:r>
+            <a:r>
+              <a:rPr lang="pt-BR" sz="1600" dirty="0" err="1" smtClean="0">
+                <a:latin typeface="Courier New" panose="02070309020205020404" pitchFamily="49" charset="0"/>
+                <a:cs typeface="Courier New" panose="02070309020205020404" pitchFamily="49" charset="0"/>
+              </a:rPr>
+              <a:t>quad</a:t>
+            </a:r>
+            <a:r>
+              <a:rPr lang="pt-BR" sz="1600" dirty="0" smtClean="0">
+                <a:latin typeface="Courier New" panose="02070309020205020404" pitchFamily="49" charset="0"/>
+                <a:cs typeface="Courier New" panose="02070309020205020404" pitchFamily="49" charset="0"/>
+              </a:rPr>
+              <a:t> </a:t>
+            </a:r>
+            <a:r>
+              <a:rPr lang="pt-BR" sz="1600" dirty="0">
+                <a:latin typeface="Courier New" panose="02070309020205020404" pitchFamily="49" charset="0"/>
+                <a:cs typeface="Courier New" panose="02070309020205020404" pitchFamily="49" charset="0"/>
+              </a:rPr>
+              <a:t>= </a:t>
+            </a:r>
+            <a:r>
+              <a:rPr lang="pt-BR" sz="1600" dirty="0" err="1" smtClean="0">
+                <a:latin typeface="Courier New" panose="02070309020205020404" pitchFamily="49" charset="0"/>
+                <a:cs typeface="Courier New" panose="02070309020205020404" pitchFamily="49" charset="0"/>
+              </a:rPr>
+              <a:t>tile_atual</a:t>
+            </a:r>
+            <a:r>
+              <a:rPr lang="pt-BR" sz="1600" dirty="0" smtClean="0">
+                <a:latin typeface="Courier New" panose="02070309020205020404" pitchFamily="49" charset="0"/>
+                <a:cs typeface="Courier New" panose="02070309020205020404" pitchFamily="49" charset="0"/>
+              </a:rPr>
+              <a:t>,</a:t>
+            </a:r>
+          </a:p>
+          <a:p>
+            <a:pPr>
+              <a:lnSpc>
+                <a:spcPts val="2200"/>
+              </a:lnSpc>
+            </a:pPr>
+            <a:r>
+              <a:rPr lang="pt-BR" sz="1600" dirty="0">
+                <a:latin typeface="Courier New" panose="02070309020205020404" pitchFamily="49" charset="0"/>
+                <a:cs typeface="Courier New" panose="02070309020205020404" pitchFamily="49" charset="0"/>
+              </a:rPr>
+              <a:t> </a:t>
+            </a:r>
+            <a:r>
+              <a:rPr lang="pt-BR" sz="1600" dirty="0" smtClean="0">
+                <a:latin typeface="Courier New" panose="02070309020205020404" pitchFamily="49" charset="0"/>
+                <a:cs typeface="Courier New" panose="02070309020205020404" pitchFamily="49" charset="0"/>
+              </a:rPr>
+              <a:t>                      </a:t>
+            </a:r>
+            <a:r>
+              <a:rPr lang="pt-BR" sz="1600" dirty="0" err="1" smtClean="0">
+                <a:latin typeface="Courier New" panose="02070309020205020404" pitchFamily="49" charset="0"/>
+                <a:cs typeface="Courier New" panose="02070309020205020404" pitchFamily="49" charset="0"/>
+              </a:rPr>
+              <a:t>visivel</a:t>
+            </a:r>
+            <a:r>
+              <a:rPr lang="pt-BR" sz="1600" dirty="0" smtClean="0">
+                <a:latin typeface="Courier New" panose="02070309020205020404" pitchFamily="49" charset="0"/>
+                <a:cs typeface="Courier New" panose="02070309020205020404" pitchFamily="49" charset="0"/>
+              </a:rPr>
+              <a:t> </a:t>
+            </a:r>
+            <a:r>
+              <a:rPr lang="pt-BR" sz="1600" dirty="0">
+                <a:latin typeface="Courier New" panose="02070309020205020404" pitchFamily="49" charset="0"/>
+                <a:cs typeface="Courier New" panose="02070309020205020404" pitchFamily="49" charset="0"/>
+              </a:rPr>
+              <a:t>= </a:t>
+            </a:r>
+            <a:r>
+              <a:rPr lang="pt-BR" sz="1600" dirty="0" err="1">
+                <a:latin typeface="Courier New" panose="02070309020205020404" pitchFamily="49" charset="0"/>
+                <a:cs typeface="Courier New" panose="02070309020205020404" pitchFamily="49" charset="0"/>
+              </a:rPr>
+              <a:t>true</a:t>
+            </a:r>
+            <a:r>
+              <a:rPr lang="pt-BR" sz="1600" dirty="0">
+                <a:latin typeface="Courier New" panose="02070309020205020404" pitchFamily="49" charset="0"/>
+                <a:cs typeface="Courier New" panose="02070309020205020404" pitchFamily="49" charset="0"/>
+              </a:rPr>
+              <a:t>}</a:t>
+            </a:r>
+          </a:p>
+          <a:p>
+            <a:pPr>
+              <a:lnSpc>
+                <a:spcPts val="2200"/>
+              </a:lnSpc>
+            </a:pPr>
+            <a:r>
+              <a:rPr lang="pt-BR" sz="1600" dirty="0">
+                <a:latin typeface="Courier New" panose="02070309020205020404" pitchFamily="49" charset="0"/>
+                <a:cs typeface="Courier New" panose="02070309020205020404" pitchFamily="49" charset="0"/>
+              </a:rPr>
+              <a:t> </a:t>
+            </a:r>
+            <a:r>
+              <a:rPr lang="pt-BR" sz="1600" dirty="0" smtClean="0">
+                <a:latin typeface="Courier New" panose="02070309020205020404" pitchFamily="49" charset="0"/>
+                <a:cs typeface="Courier New" panose="02070309020205020404" pitchFamily="49" charset="0"/>
+              </a:rPr>
+              <a:t>   </a:t>
+            </a:r>
+            <a:r>
+              <a:rPr lang="pt-BR" sz="1600" b="1" dirty="0" err="1" smtClean="0">
+                <a:solidFill>
+                  <a:schemeClr val="accent1"/>
+                </a:solidFill>
+                <a:latin typeface="Courier New" panose="02070309020205020404" pitchFamily="49" charset="0"/>
+                <a:cs typeface="Courier New" panose="02070309020205020404" pitchFamily="49" charset="0"/>
+              </a:rPr>
+              <a:t>if</a:t>
+            </a:r>
+            <a:r>
+              <a:rPr lang="pt-BR" sz="1600" dirty="0" smtClean="0">
+                <a:latin typeface="Courier New" panose="02070309020205020404" pitchFamily="49" charset="0"/>
+                <a:cs typeface="Courier New" panose="02070309020205020404" pitchFamily="49" charset="0"/>
+              </a:rPr>
+              <a:t>(x</a:t>
+            </a:r>
+            <a:r>
+              <a:rPr lang="pt-BR" sz="1600" dirty="0" smtClean="0">
+                <a:solidFill>
+                  <a:schemeClr val="accent1"/>
+                </a:solidFill>
+                <a:latin typeface="Courier New" panose="02070309020205020404" pitchFamily="49" charset="0"/>
+                <a:cs typeface="Courier New" panose="02070309020205020404" pitchFamily="49" charset="0"/>
+              </a:rPr>
+              <a:t> </a:t>
+            </a:r>
+            <a:r>
+              <a:rPr lang="pt-BR" sz="1600" dirty="0">
+                <a:latin typeface="Courier New" panose="02070309020205020404" pitchFamily="49" charset="0"/>
+                <a:cs typeface="Courier New" panose="02070309020205020404" pitchFamily="49" charset="0"/>
+              </a:rPr>
+              <a:t>== </a:t>
+            </a:r>
+            <a:r>
+              <a:rPr lang="pt-BR" sz="1600" dirty="0">
+                <a:solidFill>
+                  <a:schemeClr val="accent2"/>
+                </a:solidFill>
+                <a:latin typeface="Courier New" panose="02070309020205020404" pitchFamily="49" charset="0"/>
+                <a:cs typeface="Courier New" panose="02070309020205020404" pitchFamily="49" charset="0"/>
+              </a:rPr>
+              <a:t>900</a:t>
+            </a:r>
+            <a:r>
+              <a:rPr lang="pt-BR" sz="1600" dirty="0">
+                <a:latin typeface="Courier New" panose="02070309020205020404" pitchFamily="49" charset="0"/>
+                <a:cs typeface="Courier New" panose="02070309020205020404" pitchFamily="49" charset="0"/>
+              </a:rPr>
+              <a:t> - </a:t>
+            </a:r>
+            <a:r>
+              <a:rPr lang="pt-BR" sz="1600" dirty="0" err="1">
+                <a:latin typeface="Courier New" panose="02070309020205020404" pitchFamily="49" charset="0"/>
+                <a:cs typeface="Courier New" panose="02070309020205020404" pitchFamily="49" charset="0"/>
+              </a:rPr>
+              <a:t>tamanho_tile</a:t>
+            </a:r>
+            <a:r>
+              <a:rPr lang="pt-BR" sz="1600" dirty="0">
+                <a:latin typeface="Courier New" panose="02070309020205020404" pitchFamily="49" charset="0"/>
+                <a:cs typeface="Courier New" panose="02070309020205020404" pitchFamily="49" charset="0"/>
+              </a:rPr>
+              <a:t>) </a:t>
+            </a:r>
+            <a:r>
+              <a:rPr lang="pt-BR" sz="1600" b="1" dirty="0" err="1">
+                <a:solidFill>
+                  <a:schemeClr val="accent1"/>
+                </a:solidFill>
+                <a:latin typeface="Courier New" panose="02070309020205020404" pitchFamily="49" charset="0"/>
+                <a:cs typeface="Courier New" panose="02070309020205020404" pitchFamily="49" charset="0"/>
+              </a:rPr>
+              <a:t>then</a:t>
+            </a:r>
+            <a:r>
+              <a:rPr lang="pt-BR" sz="1600" dirty="0">
+                <a:solidFill>
+                  <a:schemeClr val="accent1"/>
+                </a:solidFill>
+                <a:latin typeface="Courier New" panose="02070309020205020404" pitchFamily="49" charset="0"/>
+                <a:cs typeface="Courier New" panose="02070309020205020404" pitchFamily="49" charset="0"/>
+              </a:rPr>
+              <a:t> </a:t>
+            </a:r>
+            <a:r>
+              <a:rPr lang="pt-BR" sz="1600" dirty="0" smtClean="0">
+                <a:latin typeface="Courier New" panose="02070309020205020404" pitchFamily="49" charset="0"/>
+                <a:cs typeface="Courier New" panose="02070309020205020404" pitchFamily="49" charset="0"/>
+              </a:rPr>
+              <a:t>--p/ </a:t>
+            </a:r>
+            <a:r>
+              <a:rPr lang="pt-BR" sz="1600" dirty="0" err="1" smtClean="0">
+                <a:latin typeface="Courier New" panose="02070309020205020404" pitchFamily="49" charset="0"/>
+                <a:cs typeface="Courier New" panose="02070309020205020404" pitchFamily="49" charset="0"/>
+              </a:rPr>
+              <a:t>próx</a:t>
+            </a:r>
+            <a:r>
+              <a:rPr lang="pt-BR" sz="1600" dirty="0" smtClean="0">
+                <a:latin typeface="Courier New" panose="02070309020205020404" pitchFamily="49" charset="0"/>
+                <a:cs typeface="Courier New" panose="02070309020205020404" pitchFamily="49" charset="0"/>
+              </a:rPr>
+              <a:t>. </a:t>
+            </a:r>
+            <a:r>
+              <a:rPr lang="pt-BR" sz="1600" dirty="0">
+                <a:latin typeface="Courier New" panose="02070309020205020404" pitchFamily="49" charset="0"/>
+                <a:cs typeface="Courier New" panose="02070309020205020404" pitchFamily="49" charset="0"/>
+              </a:rPr>
+              <a:t>linha</a:t>
+            </a:r>
+          </a:p>
+          <a:p>
+            <a:pPr>
+              <a:lnSpc>
+                <a:spcPts val="2200"/>
+              </a:lnSpc>
+            </a:pPr>
+            <a:r>
+              <a:rPr lang="pt-BR" sz="1600" dirty="0" smtClean="0">
+                <a:latin typeface="Courier New" panose="02070309020205020404" pitchFamily="49" charset="0"/>
+                <a:cs typeface="Courier New" panose="02070309020205020404" pitchFamily="49" charset="0"/>
+              </a:rPr>
+              <a:t>      x </a:t>
+            </a:r>
+            <a:r>
+              <a:rPr lang="pt-BR" sz="1600" dirty="0">
+                <a:latin typeface="Courier New" panose="02070309020205020404" pitchFamily="49" charset="0"/>
+                <a:cs typeface="Courier New" panose="02070309020205020404" pitchFamily="49" charset="0"/>
+              </a:rPr>
+              <a:t>= </a:t>
+            </a:r>
+            <a:r>
+              <a:rPr lang="pt-BR" sz="1600" dirty="0">
+                <a:solidFill>
+                  <a:schemeClr val="accent2"/>
+                </a:solidFill>
+                <a:latin typeface="Courier New" panose="02070309020205020404" pitchFamily="49" charset="0"/>
+                <a:cs typeface="Courier New" panose="02070309020205020404" pitchFamily="49" charset="0"/>
+              </a:rPr>
+              <a:t>0</a:t>
+            </a:r>
+          </a:p>
+          <a:p>
+            <a:pPr>
+              <a:lnSpc>
+                <a:spcPts val="2200"/>
+              </a:lnSpc>
+            </a:pPr>
+            <a:r>
+              <a:rPr lang="pt-BR" sz="1600" dirty="0" smtClean="0">
+                <a:latin typeface="Courier New" panose="02070309020205020404" pitchFamily="49" charset="0"/>
+                <a:cs typeface="Courier New" panose="02070309020205020404" pitchFamily="49" charset="0"/>
+              </a:rPr>
+              <a:t>      y </a:t>
+            </a:r>
+            <a:r>
+              <a:rPr lang="pt-BR" sz="1600" dirty="0">
+                <a:latin typeface="Courier New" panose="02070309020205020404" pitchFamily="49" charset="0"/>
+                <a:cs typeface="Courier New" panose="02070309020205020404" pitchFamily="49" charset="0"/>
+              </a:rPr>
+              <a:t>= </a:t>
+            </a:r>
+            <a:r>
+              <a:rPr lang="pt-BR" sz="1600" dirty="0" err="1" smtClean="0">
+                <a:latin typeface="Courier New" panose="02070309020205020404" pitchFamily="49" charset="0"/>
+                <a:cs typeface="Courier New" panose="02070309020205020404" pitchFamily="49" charset="0"/>
+              </a:rPr>
+              <a:t>tam_tile</a:t>
+            </a:r>
+            <a:r>
+              <a:rPr lang="pt-BR" sz="1600" dirty="0" smtClean="0">
+                <a:latin typeface="Courier New" panose="02070309020205020404" pitchFamily="49" charset="0"/>
+                <a:cs typeface="Courier New" panose="02070309020205020404" pitchFamily="49" charset="0"/>
+              </a:rPr>
+              <a:t> </a:t>
+            </a:r>
+            <a:r>
+              <a:rPr lang="pt-BR" sz="1600" dirty="0">
+                <a:latin typeface="Courier New" panose="02070309020205020404" pitchFamily="49" charset="0"/>
+                <a:cs typeface="Courier New" panose="02070309020205020404" pitchFamily="49" charset="0"/>
+              </a:rPr>
+              <a:t>+ y</a:t>
+            </a:r>
+          </a:p>
+          <a:p>
+            <a:pPr>
+              <a:lnSpc>
+                <a:spcPts val="2200"/>
+              </a:lnSpc>
+            </a:pPr>
+            <a:r>
+              <a:rPr lang="pt-BR" sz="1600" dirty="0" smtClean="0">
+                <a:latin typeface="Courier New" panose="02070309020205020404" pitchFamily="49" charset="0"/>
+                <a:cs typeface="Courier New" panose="02070309020205020404" pitchFamily="49" charset="0"/>
+              </a:rPr>
+              <a:t>    </a:t>
+            </a:r>
+            <a:r>
+              <a:rPr lang="pt-BR" sz="1600" b="1" dirty="0" err="1" smtClean="0">
+                <a:solidFill>
+                  <a:schemeClr val="accent1"/>
+                </a:solidFill>
+                <a:latin typeface="Courier New" panose="02070309020205020404" pitchFamily="49" charset="0"/>
+                <a:cs typeface="Courier New" panose="02070309020205020404" pitchFamily="49" charset="0"/>
+              </a:rPr>
+              <a:t>else</a:t>
+            </a:r>
+            <a:r>
+              <a:rPr lang="pt-BR" sz="1600" dirty="0" smtClean="0">
+                <a:solidFill>
+                  <a:schemeClr val="accent1"/>
+                </a:solidFill>
+                <a:latin typeface="Courier New" panose="02070309020205020404" pitchFamily="49" charset="0"/>
+                <a:cs typeface="Courier New" panose="02070309020205020404" pitchFamily="49" charset="0"/>
+              </a:rPr>
+              <a:t> </a:t>
+            </a:r>
+            <a:r>
+              <a:rPr lang="pt-BR" sz="1600" dirty="0">
+                <a:latin typeface="Courier New" panose="02070309020205020404" pitchFamily="49" charset="0"/>
+                <a:cs typeface="Courier New" panose="02070309020205020404" pitchFamily="49" charset="0"/>
+              </a:rPr>
+              <a:t>--siga pela linha</a:t>
+            </a:r>
+          </a:p>
+          <a:p>
+            <a:pPr>
+              <a:lnSpc>
+                <a:spcPts val="2200"/>
+              </a:lnSpc>
+            </a:pPr>
+            <a:r>
+              <a:rPr lang="pt-BR" sz="1600" dirty="0" smtClean="0">
+                <a:latin typeface="Courier New" panose="02070309020205020404" pitchFamily="49" charset="0"/>
+                <a:cs typeface="Courier New" panose="02070309020205020404" pitchFamily="49" charset="0"/>
+              </a:rPr>
+              <a:t>      x </a:t>
+            </a:r>
+            <a:r>
+              <a:rPr lang="pt-BR" sz="1600" dirty="0">
+                <a:latin typeface="Courier New" panose="02070309020205020404" pitchFamily="49" charset="0"/>
+                <a:cs typeface="Courier New" panose="02070309020205020404" pitchFamily="49" charset="0"/>
+              </a:rPr>
+              <a:t>= </a:t>
+            </a:r>
+            <a:r>
+              <a:rPr lang="pt-BR" sz="1600" dirty="0" err="1" smtClean="0">
+                <a:latin typeface="Courier New" panose="02070309020205020404" pitchFamily="49" charset="0"/>
+                <a:cs typeface="Courier New" panose="02070309020205020404" pitchFamily="49" charset="0"/>
+              </a:rPr>
+              <a:t>tam_tile</a:t>
+            </a:r>
+            <a:r>
+              <a:rPr lang="pt-BR" sz="1600" dirty="0" smtClean="0">
+                <a:latin typeface="Courier New" panose="02070309020205020404" pitchFamily="49" charset="0"/>
+                <a:cs typeface="Courier New" panose="02070309020205020404" pitchFamily="49" charset="0"/>
+              </a:rPr>
+              <a:t> </a:t>
+            </a:r>
+            <a:r>
+              <a:rPr lang="pt-BR" sz="1600" dirty="0">
+                <a:latin typeface="Courier New" panose="02070309020205020404" pitchFamily="49" charset="0"/>
+                <a:cs typeface="Courier New" panose="02070309020205020404" pitchFamily="49" charset="0"/>
+              </a:rPr>
+              <a:t>+ x</a:t>
+            </a:r>
+          </a:p>
+          <a:p>
+            <a:pPr>
+              <a:lnSpc>
+                <a:spcPts val="2200"/>
+              </a:lnSpc>
+            </a:pPr>
+            <a:r>
+              <a:rPr lang="pt-BR" sz="1600" dirty="0" smtClean="0">
+                <a:latin typeface="Courier New" panose="02070309020205020404" pitchFamily="49" charset="0"/>
+                <a:cs typeface="Courier New" panose="02070309020205020404" pitchFamily="49" charset="0"/>
+              </a:rPr>
+              <a:t>    </a:t>
+            </a:r>
+            <a:r>
+              <a:rPr lang="pt-BR" sz="1600" b="1" dirty="0" err="1" smtClean="0">
+                <a:solidFill>
+                  <a:schemeClr val="accent1"/>
+                </a:solidFill>
+                <a:latin typeface="Courier New" panose="02070309020205020404" pitchFamily="49" charset="0"/>
+                <a:cs typeface="Courier New" panose="02070309020205020404" pitchFamily="49" charset="0"/>
+              </a:rPr>
+              <a:t>end</a:t>
+            </a:r>
+            <a:endParaRPr lang="pt-BR" sz="1600" b="1" dirty="0">
+              <a:solidFill>
+                <a:schemeClr val="accent1"/>
+              </a:solidFill>
+              <a:latin typeface="Courier New" panose="02070309020205020404" pitchFamily="49" charset="0"/>
+              <a:cs typeface="Courier New" panose="02070309020205020404" pitchFamily="49" charset="0"/>
+            </a:endParaRPr>
+          </a:p>
+          <a:p>
+            <a:pPr>
+              <a:lnSpc>
+                <a:spcPts val="2200"/>
+              </a:lnSpc>
+            </a:pPr>
+            <a:r>
+              <a:rPr lang="pt-BR" sz="1600" dirty="0" smtClean="0">
+                <a:latin typeface="Courier New" panose="02070309020205020404" pitchFamily="49" charset="0"/>
+                <a:cs typeface="Courier New" panose="02070309020205020404" pitchFamily="49" charset="0"/>
+              </a:rPr>
+              <a:t>  </a:t>
+            </a:r>
+            <a:r>
+              <a:rPr lang="pt-BR" sz="1600" b="1" dirty="0" err="1" smtClean="0">
+                <a:solidFill>
+                  <a:schemeClr val="accent1"/>
+                </a:solidFill>
+                <a:latin typeface="Courier New" panose="02070309020205020404" pitchFamily="49" charset="0"/>
+                <a:cs typeface="Courier New" panose="02070309020205020404" pitchFamily="49" charset="0"/>
+              </a:rPr>
+              <a:t>end</a:t>
+            </a:r>
+            <a:endParaRPr lang="pt-BR" sz="1600" b="1" dirty="0">
+              <a:solidFill>
+                <a:schemeClr val="accent1"/>
+              </a:solidFill>
+              <a:latin typeface="Courier New" panose="02070309020205020404" pitchFamily="49" charset="0"/>
+              <a:cs typeface="Courier New" panose="02070309020205020404" pitchFamily="49" charset="0"/>
+            </a:endParaRPr>
+          </a:p>
+          <a:p>
+            <a:pPr>
+              <a:lnSpc>
+                <a:spcPts val="2200"/>
+              </a:lnSpc>
+            </a:pPr>
+            <a:r>
+              <a:rPr lang="pt-BR" sz="1600" dirty="0">
+                <a:latin typeface="Courier New" panose="02070309020205020404" pitchFamily="49" charset="0"/>
+                <a:cs typeface="Courier New" panose="02070309020205020404" pitchFamily="49" charset="0"/>
+              </a:rPr>
+              <a:t>  </a:t>
+            </a:r>
+            <a:r>
+              <a:rPr lang="pt-BR" sz="1600" dirty="0" smtClean="0">
+                <a:latin typeface="Courier New" panose="02070309020205020404" pitchFamily="49" charset="0"/>
+                <a:cs typeface="Courier New" panose="02070309020205020404" pitchFamily="49" charset="0"/>
+              </a:rPr>
+              <a:t>--</a:t>
+            </a:r>
+            <a:r>
+              <a:rPr lang="pt-BR" sz="1600" dirty="0">
+                <a:latin typeface="Courier New" panose="02070309020205020404" pitchFamily="49" charset="0"/>
+                <a:cs typeface="Courier New" panose="02070309020205020404" pitchFamily="49" charset="0"/>
+              </a:rPr>
+              <a:t>deixa o ultimo </a:t>
+            </a:r>
+            <a:r>
+              <a:rPr lang="pt-BR" sz="1600" dirty="0" smtClean="0">
+                <a:latin typeface="Courier New" panose="02070309020205020404" pitchFamily="49" charset="0"/>
+                <a:cs typeface="Courier New" panose="02070309020205020404" pitchFamily="49" charset="0"/>
+              </a:rPr>
+              <a:t>invisível</a:t>
+            </a:r>
+            <a:endParaRPr lang="pt-BR" sz="1600" dirty="0">
+              <a:latin typeface="Courier New" panose="02070309020205020404" pitchFamily="49" charset="0"/>
+              <a:cs typeface="Courier New" panose="02070309020205020404" pitchFamily="49" charset="0"/>
+            </a:endParaRPr>
+          </a:p>
+          <a:p>
+            <a:pPr>
+              <a:lnSpc>
+                <a:spcPts val="2200"/>
+              </a:lnSpc>
+            </a:pPr>
+            <a:r>
+              <a:rPr lang="pt-BR" sz="1600" dirty="0">
+                <a:latin typeface="Courier New" panose="02070309020205020404" pitchFamily="49" charset="0"/>
+                <a:cs typeface="Courier New" panose="02070309020205020404" pitchFamily="49" charset="0"/>
+              </a:rPr>
+              <a:t>  </a:t>
+            </a:r>
+            <a:r>
+              <a:rPr lang="pt-BR" sz="1600" dirty="0" smtClean="0">
+                <a:latin typeface="Courier New" panose="02070309020205020404" pitchFamily="49" charset="0"/>
+                <a:cs typeface="Courier New" panose="02070309020205020404" pitchFamily="49" charset="0"/>
+              </a:rPr>
+              <a:t>tiles</a:t>
+            </a:r>
+            <a:r>
+              <a:rPr lang="pt-BR" sz="1600" dirty="0">
+                <a:latin typeface="Courier New" panose="02070309020205020404" pitchFamily="49" charset="0"/>
+                <a:cs typeface="Courier New" panose="02070309020205020404" pitchFamily="49" charset="0"/>
+              </a:rPr>
+              <a:t>[#tiles].</a:t>
+            </a:r>
+            <a:r>
+              <a:rPr lang="pt-BR" sz="1600" dirty="0" err="1">
+                <a:latin typeface="Courier New" panose="02070309020205020404" pitchFamily="49" charset="0"/>
+                <a:cs typeface="Courier New" panose="02070309020205020404" pitchFamily="49" charset="0"/>
+              </a:rPr>
+              <a:t>visivel</a:t>
+            </a:r>
+            <a:r>
+              <a:rPr lang="pt-BR" sz="1600" dirty="0">
+                <a:latin typeface="Courier New" panose="02070309020205020404" pitchFamily="49" charset="0"/>
+                <a:cs typeface="Courier New" panose="02070309020205020404" pitchFamily="49" charset="0"/>
+              </a:rPr>
+              <a:t> = </a:t>
+            </a:r>
+            <a:r>
+              <a:rPr lang="pt-BR" sz="1600" dirty="0" smtClean="0">
+                <a:latin typeface="Courier New" panose="02070309020205020404" pitchFamily="49" charset="0"/>
+                <a:cs typeface="Courier New" panose="02070309020205020404" pitchFamily="49" charset="0"/>
+              </a:rPr>
+              <a:t>false</a:t>
+            </a:r>
+            <a:endParaRPr lang="pt-BR" sz="1600" dirty="0">
+              <a:latin typeface="Courier New" panose="02070309020205020404" pitchFamily="49" charset="0"/>
+              <a:cs typeface="Courier New" panose="02070309020205020404" pitchFamily="49" charset="0"/>
+            </a:endParaRPr>
+          </a:p>
+          <a:p>
+            <a:pPr>
+              <a:lnSpc>
+                <a:spcPts val="2200"/>
+              </a:lnSpc>
+            </a:pPr>
+            <a:r>
+              <a:rPr lang="pt-BR" sz="1600" dirty="0" smtClean="0">
+                <a:latin typeface="Courier New" panose="02070309020205020404" pitchFamily="49" charset="0"/>
+                <a:cs typeface="Courier New" panose="02070309020205020404" pitchFamily="49" charset="0"/>
+              </a:rPr>
+              <a:t>  </a:t>
+            </a:r>
+            <a:r>
+              <a:rPr lang="pt-BR" sz="1600" b="1" dirty="0" err="1">
+                <a:solidFill>
+                  <a:schemeClr val="accent1"/>
+                </a:solidFill>
+                <a:latin typeface="Courier New" panose="02070309020205020404" pitchFamily="49" charset="0"/>
+                <a:cs typeface="Courier New" panose="02070309020205020404" pitchFamily="49" charset="0"/>
+              </a:rPr>
+              <a:t>return</a:t>
+            </a:r>
+            <a:r>
+              <a:rPr lang="pt-BR" sz="1600" dirty="0">
+                <a:solidFill>
+                  <a:schemeClr val="accent1"/>
+                </a:solidFill>
+                <a:latin typeface="Courier New" panose="02070309020205020404" pitchFamily="49" charset="0"/>
+                <a:cs typeface="Courier New" panose="02070309020205020404" pitchFamily="49" charset="0"/>
+              </a:rPr>
+              <a:t> </a:t>
+            </a:r>
+            <a:r>
+              <a:rPr lang="pt-BR" sz="1600" dirty="0">
+                <a:latin typeface="Courier New" panose="02070309020205020404" pitchFamily="49" charset="0"/>
+                <a:cs typeface="Courier New" panose="02070309020205020404" pitchFamily="49" charset="0"/>
+              </a:rPr>
+              <a:t>tiles</a:t>
+            </a:r>
+          </a:p>
+          <a:p>
+            <a:pPr>
+              <a:lnSpc>
+                <a:spcPts val="2200"/>
+              </a:lnSpc>
+            </a:pPr>
+            <a:r>
+              <a:rPr lang="pt-BR" sz="1600" b="1" dirty="0" err="1">
+                <a:solidFill>
+                  <a:schemeClr val="accent1"/>
+                </a:solidFill>
+                <a:latin typeface="Courier New" panose="02070309020205020404" pitchFamily="49" charset="0"/>
+                <a:cs typeface="Courier New" panose="02070309020205020404" pitchFamily="49" charset="0"/>
+              </a:rPr>
+              <a:t>end</a:t>
+            </a:r>
+            <a:endParaRPr lang="pt-BR" sz="1600" b="1" dirty="0">
+              <a:solidFill>
+                <a:schemeClr val="accent1"/>
+              </a:solidFill>
+              <a:latin typeface="Courier New" panose="02070309020205020404" pitchFamily="49" charset="0"/>
+              <a:cs typeface="Courier New" panose="02070309020205020404" pitchFamily="49" charset="0"/>
+            </a:endParaRPr>
+          </a:p>
+        </p:txBody>
+      </p:sp>
     </p:spTree>
     <p:extLst>
       <p:ext uri="{BB962C8B-B14F-4D97-AF65-F5344CB8AC3E}">
@@ -7777,6 +8983,368 @@
           </a:prstGeom>
         </p:spPr>
       </p:pic>
+      <p:sp>
+        <p:nvSpPr>
+          <p:cNvPr id="13" name="Retângulo 12"/>
+          <p:cNvSpPr/>
+          <p:nvPr/>
+        </p:nvSpPr>
+        <p:spPr>
+          <a:xfrm>
+            <a:off x="5806515" y="1196752"/>
+            <a:ext cx="6092825" cy="4524315"/>
+          </a:xfrm>
+          <a:prstGeom prst="rect">
+            <a:avLst/>
+          </a:prstGeom>
+        </p:spPr>
+        <p:txBody>
+          <a:bodyPr>
+            <a:spAutoFit/>
+          </a:bodyPr>
+          <a:lstStyle/>
+          <a:p>
+            <a:r>
+              <a:rPr lang="pt-BR" b="1" dirty="0" err="1">
+                <a:solidFill>
+                  <a:schemeClr val="accent1"/>
+                </a:solidFill>
+                <a:latin typeface="Courier New" panose="02070309020205020404" pitchFamily="49" charset="0"/>
+                <a:cs typeface="Courier New" panose="02070309020205020404" pitchFamily="49" charset="0"/>
+              </a:rPr>
+              <a:t>function</a:t>
+            </a:r>
+            <a:r>
+              <a:rPr lang="pt-BR" dirty="0">
+                <a:solidFill>
+                  <a:schemeClr val="accent1"/>
+                </a:solidFill>
+                <a:latin typeface="Courier New" panose="02070309020205020404" pitchFamily="49" charset="0"/>
+                <a:cs typeface="Courier New" panose="02070309020205020404" pitchFamily="49" charset="0"/>
+              </a:rPr>
+              <a:t> </a:t>
+            </a:r>
+            <a:r>
+              <a:rPr lang="pt-BR" u="sng" dirty="0" err="1">
+                <a:latin typeface="Courier New" panose="02070309020205020404" pitchFamily="49" charset="0"/>
+                <a:cs typeface="Courier New" panose="02070309020205020404" pitchFamily="49" charset="0"/>
+              </a:rPr>
+              <a:t>embaralha_tabela</a:t>
+            </a:r>
+            <a:r>
+              <a:rPr lang="pt-BR" dirty="0">
+                <a:latin typeface="Courier New" panose="02070309020205020404" pitchFamily="49" charset="0"/>
+                <a:cs typeface="Courier New" panose="02070309020205020404" pitchFamily="49" charset="0"/>
+              </a:rPr>
+              <a:t>(t)</a:t>
+            </a:r>
+          </a:p>
+          <a:p>
+            <a:r>
+              <a:rPr lang="pt-BR" dirty="0">
+                <a:latin typeface="Courier New" panose="02070309020205020404" pitchFamily="49" charset="0"/>
+                <a:cs typeface="Courier New" panose="02070309020205020404" pitchFamily="49" charset="0"/>
+              </a:rPr>
+              <a:t>    </a:t>
+            </a:r>
+          </a:p>
+          <a:p>
+            <a:r>
+              <a:rPr lang="pt-BR" dirty="0">
+                <a:latin typeface="Courier New" panose="02070309020205020404" pitchFamily="49" charset="0"/>
+                <a:cs typeface="Courier New" panose="02070309020205020404" pitchFamily="49" charset="0"/>
+              </a:rPr>
+              <a:t>  </a:t>
+            </a:r>
+            <a:r>
+              <a:rPr lang="pt-BR" b="1" dirty="0" smtClean="0">
+                <a:solidFill>
+                  <a:schemeClr val="accent1"/>
+                </a:solidFill>
+                <a:latin typeface="Courier New" panose="02070309020205020404" pitchFamily="49" charset="0"/>
+                <a:cs typeface="Courier New" panose="02070309020205020404" pitchFamily="49" charset="0"/>
+              </a:rPr>
+              <a:t>local</a:t>
+            </a:r>
+            <a:r>
+              <a:rPr lang="pt-BR" dirty="0" smtClean="0">
+                <a:latin typeface="Courier New" panose="02070309020205020404" pitchFamily="49" charset="0"/>
+                <a:cs typeface="Courier New" panose="02070309020205020404" pitchFamily="49" charset="0"/>
+              </a:rPr>
+              <a:t> </a:t>
+            </a:r>
+            <a:r>
+              <a:rPr lang="pt-BR" dirty="0">
+                <a:latin typeface="Courier New" panose="02070309020205020404" pitchFamily="49" charset="0"/>
+                <a:cs typeface="Courier New" panose="02070309020205020404" pitchFamily="49" charset="0"/>
+              </a:rPr>
+              <a:t>j</a:t>
+            </a:r>
+          </a:p>
+          <a:p>
+            <a:r>
+              <a:rPr lang="pt-BR" dirty="0">
+                <a:latin typeface="Courier New" panose="02070309020205020404" pitchFamily="49" charset="0"/>
+                <a:cs typeface="Courier New" panose="02070309020205020404" pitchFamily="49" charset="0"/>
+              </a:rPr>
+              <a:t> </a:t>
+            </a:r>
+          </a:p>
+          <a:p>
+            <a:r>
+              <a:rPr lang="pt-BR" dirty="0">
+                <a:latin typeface="Courier New" panose="02070309020205020404" pitchFamily="49" charset="0"/>
+                <a:cs typeface="Courier New" panose="02070309020205020404" pitchFamily="49" charset="0"/>
+              </a:rPr>
+              <a:t>  </a:t>
+            </a:r>
+            <a:r>
+              <a:rPr lang="pt-BR" b="1" dirty="0" smtClean="0">
+                <a:solidFill>
+                  <a:schemeClr val="accent1"/>
+                </a:solidFill>
+                <a:latin typeface="Courier New" panose="02070309020205020404" pitchFamily="49" charset="0"/>
+                <a:cs typeface="Courier New" panose="02070309020205020404" pitchFamily="49" charset="0"/>
+              </a:rPr>
+              <a:t>for</a:t>
+            </a:r>
+            <a:r>
+              <a:rPr lang="pt-BR" dirty="0" smtClean="0">
+                <a:latin typeface="Courier New" panose="02070309020205020404" pitchFamily="49" charset="0"/>
+                <a:cs typeface="Courier New" panose="02070309020205020404" pitchFamily="49" charset="0"/>
+              </a:rPr>
+              <a:t> </a:t>
+            </a:r>
+            <a:r>
+              <a:rPr lang="pt-BR" dirty="0">
+                <a:latin typeface="Courier New" panose="02070309020205020404" pitchFamily="49" charset="0"/>
+                <a:cs typeface="Courier New" panose="02070309020205020404" pitchFamily="49" charset="0"/>
+              </a:rPr>
+              <a:t>i = #t, </a:t>
+            </a:r>
+            <a:r>
+              <a:rPr lang="pt-BR" dirty="0">
+                <a:solidFill>
+                  <a:schemeClr val="accent2"/>
+                </a:solidFill>
+                <a:latin typeface="Courier New" panose="02070309020205020404" pitchFamily="49" charset="0"/>
+                <a:cs typeface="Courier New" panose="02070309020205020404" pitchFamily="49" charset="0"/>
+              </a:rPr>
+              <a:t>2</a:t>
+            </a:r>
+            <a:r>
+              <a:rPr lang="pt-BR" dirty="0">
+                <a:latin typeface="Courier New" panose="02070309020205020404" pitchFamily="49" charset="0"/>
+                <a:cs typeface="Courier New" panose="02070309020205020404" pitchFamily="49" charset="0"/>
+              </a:rPr>
+              <a:t>, -</a:t>
+            </a:r>
+            <a:r>
+              <a:rPr lang="pt-BR" dirty="0">
+                <a:solidFill>
+                  <a:schemeClr val="accent2"/>
+                </a:solidFill>
+                <a:latin typeface="Courier New" panose="02070309020205020404" pitchFamily="49" charset="0"/>
+                <a:cs typeface="Courier New" panose="02070309020205020404" pitchFamily="49" charset="0"/>
+              </a:rPr>
+              <a:t>1</a:t>
+            </a:r>
+            <a:r>
+              <a:rPr lang="pt-BR" dirty="0">
+                <a:latin typeface="Courier New" panose="02070309020205020404" pitchFamily="49" charset="0"/>
+                <a:cs typeface="Courier New" panose="02070309020205020404" pitchFamily="49" charset="0"/>
+              </a:rPr>
+              <a:t> </a:t>
+            </a:r>
+            <a:r>
+              <a:rPr lang="pt-BR" b="1" dirty="0">
+                <a:solidFill>
+                  <a:schemeClr val="accent1"/>
+                </a:solidFill>
+                <a:latin typeface="Courier New" panose="02070309020205020404" pitchFamily="49" charset="0"/>
+                <a:cs typeface="Courier New" panose="02070309020205020404" pitchFamily="49" charset="0"/>
+              </a:rPr>
+              <a:t>do</a:t>
+            </a:r>
+          </a:p>
+          <a:p>
+            <a:r>
+              <a:rPr lang="pt-BR" dirty="0">
+                <a:latin typeface="Courier New" panose="02070309020205020404" pitchFamily="49" charset="0"/>
+                <a:cs typeface="Courier New" panose="02070309020205020404" pitchFamily="49" charset="0"/>
+              </a:rPr>
+              <a:t>  </a:t>
+            </a:r>
+            <a:r>
+              <a:rPr lang="pt-BR" dirty="0" smtClean="0">
+                <a:latin typeface="Courier New" panose="02070309020205020404" pitchFamily="49" charset="0"/>
+                <a:cs typeface="Courier New" panose="02070309020205020404" pitchFamily="49" charset="0"/>
+              </a:rPr>
+              <a:t>  </a:t>
+            </a:r>
+            <a:r>
+              <a:rPr lang="pt-BR" dirty="0">
+                <a:latin typeface="Courier New" panose="02070309020205020404" pitchFamily="49" charset="0"/>
+                <a:cs typeface="Courier New" panose="02070309020205020404" pitchFamily="49" charset="0"/>
+              </a:rPr>
+              <a:t>j = </a:t>
+            </a:r>
+            <a:r>
+              <a:rPr lang="pt-BR" dirty="0" err="1">
+                <a:solidFill>
+                  <a:schemeClr val="accent6"/>
+                </a:solidFill>
+                <a:latin typeface="Courier New" panose="02070309020205020404" pitchFamily="49" charset="0"/>
+                <a:cs typeface="Courier New" panose="02070309020205020404" pitchFamily="49" charset="0"/>
+              </a:rPr>
+              <a:t>math.random</a:t>
+            </a:r>
+            <a:r>
+              <a:rPr lang="pt-BR" dirty="0">
+                <a:latin typeface="Courier New" panose="02070309020205020404" pitchFamily="49" charset="0"/>
+                <a:cs typeface="Courier New" panose="02070309020205020404" pitchFamily="49" charset="0"/>
+              </a:rPr>
+              <a:t> (i)</a:t>
+            </a:r>
+          </a:p>
+          <a:p>
+            <a:r>
+              <a:rPr lang="pt-BR" dirty="0">
+                <a:latin typeface="Courier New" panose="02070309020205020404" pitchFamily="49" charset="0"/>
+                <a:cs typeface="Courier New" panose="02070309020205020404" pitchFamily="49" charset="0"/>
+              </a:rPr>
+              <a:t>  </a:t>
+            </a:r>
+            <a:r>
+              <a:rPr lang="pt-BR" dirty="0" smtClean="0">
+                <a:latin typeface="Courier New" panose="02070309020205020404" pitchFamily="49" charset="0"/>
+                <a:cs typeface="Courier New" panose="02070309020205020404" pitchFamily="49" charset="0"/>
+              </a:rPr>
+              <a:t>  </a:t>
+            </a:r>
+            <a:r>
+              <a:rPr lang="pt-BR" dirty="0">
+                <a:latin typeface="Courier New" panose="02070309020205020404" pitchFamily="49" charset="0"/>
+                <a:cs typeface="Courier New" panose="02070309020205020404" pitchFamily="49" charset="0"/>
+              </a:rPr>
+              <a:t>t[i], t[j] = t[j], t[i]</a:t>
+            </a:r>
+          </a:p>
+          <a:p>
+            <a:r>
+              <a:rPr lang="pt-BR" dirty="0">
+                <a:latin typeface="Courier New" panose="02070309020205020404" pitchFamily="49" charset="0"/>
+                <a:cs typeface="Courier New" panose="02070309020205020404" pitchFamily="49" charset="0"/>
+              </a:rPr>
+              <a:t> </a:t>
+            </a:r>
+            <a:r>
+              <a:rPr lang="pt-BR" dirty="0" smtClean="0">
+                <a:latin typeface="Courier New" panose="02070309020205020404" pitchFamily="49" charset="0"/>
+                <a:cs typeface="Courier New" panose="02070309020205020404" pitchFamily="49" charset="0"/>
+              </a:rPr>
+              <a:t> </a:t>
+            </a:r>
+            <a:r>
+              <a:rPr lang="pt-BR" b="1" dirty="0" err="1">
+                <a:solidFill>
+                  <a:schemeClr val="accent1"/>
+                </a:solidFill>
+                <a:latin typeface="Courier New" panose="02070309020205020404" pitchFamily="49" charset="0"/>
+                <a:cs typeface="Courier New" panose="02070309020205020404" pitchFamily="49" charset="0"/>
+              </a:rPr>
+              <a:t>end</a:t>
+            </a:r>
+            <a:endParaRPr lang="pt-BR" b="1" dirty="0">
+              <a:solidFill>
+                <a:schemeClr val="accent1"/>
+              </a:solidFill>
+              <a:latin typeface="Courier New" panose="02070309020205020404" pitchFamily="49" charset="0"/>
+              <a:cs typeface="Courier New" panose="02070309020205020404" pitchFamily="49" charset="0"/>
+            </a:endParaRPr>
+          </a:p>
+          <a:p>
+            <a:r>
+              <a:rPr lang="pt-BR" dirty="0">
+                <a:latin typeface="Courier New" panose="02070309020205020404" pitchFamily="49" charset="0"/>
+                <a:cs typeface="Courier New" panose="02070309020205020404" pitchFamily="49" charset="0"/>
+              </a:rPr>
+              <a:t>    </a:t>
+            </a:r>
+          </a:p>
+          <a:p>
+            <a:r>
+              <a:rPr lang="pt-BR" dirty="0">
+                <a:latin typeface="Courier New" panose="02070309020205020404" pitchFamily="49" charset="0"/>
+                <a:cs typeface="Courier New" panose="02070309020205020404" pitchFamily="49" charset="0"/>
+              </a:rPr>
+              <a:t> </a:t>
+            </a:r>
+            <a:r>
+              <a:rPr lang="pt-BR" dirty="0" smtClean="0">
+                <a:latin typeface="Courier New" panose="02070309020205020404" pitchFamily="49" charset="0"/>
+                <a:cs typeface="Courier New" panose="02070309020205020404" pitchFamily="49" charset="0"/>
+              </a:rPr>
+              <a:t> </a:t>
+            </a:r>
+            <a:r>
+              <a:rPr lang="pt-BR" b="1" dirty="0" err="1">
+                <a:solidFill>
+                  <a:schemeClr val="accent1"/>
+                </a:solidFill>
+                <a:latin typeface="Courier New" panose="02070309020205020404" pitchFamily="49" charset="0"/>
+                <a:cs typeface="Courier New" panose="02070309020205020404" pitchFamily="49" charset="0"/>
+              </a:rPr>
+              <a:t>return</a:t>
+            </a:r>
+            <a:r>
+              <a:rPr lang="pt-BR" dirty="0">
+                <a:solidFill>
+                  <a:schemeClr val="accent1"/>
+                </a:solidFill>
+                <a:latin typeface="Courier New" panose="02070309020205020404" pitchFamily="49" charset="0"/>
+                <a:cs typeface="Courier New" panose="02070309020205020404" pitchFamily="49" charset="0"/>
+              </a:rPr>
+              <a:t> </a:t>
+            </a:r>
+            <a:r>
+              <a:rPr lang="pt-BR" dirty="0">
+                <a:latin typeface="Courier New" panose="02070309020205020404" pitchFamily="49" charset="0"/>
+                <a:cs typeface="Courier New" panose="02070309020205020404" pitchFamily="49" charset="0"/>
+              </a:rPr>
+              <a:t>t</a:t>
+            </a:r>
+          </a:p>
+          <a:p>
+            <a:r>
+              <a:rPr lang="pt-BR" dirty="0">
+                <a:latin typeface="Courier New" panose="02070309020205020404" pitchFamily="49" charset="0"/>
+                <a:cs typeface="Courier New" panose="02070309020205020404" pitchFamily="49" charset="0"/>
+              </a:rPr>
+              <a:t>    </a:t>
+            </a:r>
+          </a:p>
+          <a:p>
+            <a:r>
+              <a:rPr lang="pt-BR" b="1" dirty="0" err="1">
+                <a:solidFill>
+                  <a:schemeClr val="accent1"/>
+                </a:solidFill>
+                <a:latin typeface="Courier New" panose="02070309020205020404" pitchFamily="49" charset="0"/>
+                <a:cs typeface="Courier New" panose="02070309020205020404" pitchFamily="49" charset="0"/>
+              </a:rPr>
+              <a:t>end</a:t>
+            </a:r>
+            <a:endParaRPr lang="pt-BR" b="1" dirty="0">
+              <a:solidFill>
+                <a:schemeClr val="accent1"/>
+              </a:solidFill>
+              <a:latin typeface="Courier New" panose="02070309020205020404" pitchFamily="49" charset="0"/>
+              <a:cs typeface="Courier New" panose="02070309020205020404" pitchFamily="49" charset="0"/>
+            </a:endParaRPr>
+          </a:p>
+        </p:txBody>
+      </p:sp>
     </p:spTree>
     <p:extLst>
       <p:ext uri="{BB962C8B-B14F-4D97-AF65-F5344CB8AC3E}">
@@ -7919,6 +9487,868 @@
           </a:prstGeom>
         </p:spPr>
       </p:pic>
+      <p:sp>
+        <p:nvSpPr>
+          <p:cNvPr id="5" name="Retângulo 4"/>
+          <p:cNvSpPr/>
+          <p:nvPr/>
+        </p:nvSpPr>
+        <p:spPr>
+          <a:xfrm>
+            <a:off x="4870276" y="379244"/>
+            <a:ext cx="7239220" cy="6247864"/>
+          </a:xfrm>
+          <a:prstGeom prst="rect">
+            <a:avLst/>
+          </a:prstGeom>
+        </p:spPr>
+        <p:txBody>
+          <a:bodyPr wrap="square">
+            <a:spAutoFit/>
+          </a:bodyPr>
+          <a:lstStyle/>
+          <a:p>
+            <a:r>
+              <a:rPr lang="pt-BR" sz="2000" b="1" dirty="0" err="1">
+                <a:solidFill>
+                  <a:schemeClr val="accent1"/>
+                </a:solidFill>
+                <a:latin typeface="Courier New" panose="02070309020205020404" pitchFamily="49" charset="0"/>
+                <a:cs typeface="Courier New" panose="02070309020205020404" pitchFamily="49" charset="0"/>
+              </a:rPr>
+              <a:t>function</a:t>
+            </a:r>
+            <a:r>
+              <a:rPr lang="pt-BR" sz="2000" dirty="0">
+                <a:solidFill>
+                  <a:schemeClr val="accent1"/>
+                </a:solidFill>
+                <a:latin typeface="Courier New" panose="02070309020205020404" pitchFamily="49" charset="0"/>
+                <a:cs typeface="Courier New" panose="02070309020205020404" pitchFamily="49" charset="0"/>
+              </a:rPr>
+              <a:t> </a:t>
+            </a:r>
+            <a:r>
+              <a:rPr lang="pt-BR" sz="2000" dirty="0" err="1">
+                <a:latin typeface="Courier New" panose="02070309020205020404" pitchFamily="49" charset="0"/>
+                <a:cs typeface="Courier New" panose="02070309020205020404" pitchFamily="49" charset="0"/>
+              </a:rPr>
+              <a:t>troca_vizinho</a:t>
+            </a:r>
+            <a:r>
+              <a:rPr lang="pt-BR" sz="2000" dirty="0">
+                <a:latin typeface="Courier New" panose="02070309020205020404" pitchFamily="49" charset="0"/>
+                <a:cs typeface="Courier New" panose="02070309020205020404" pitchFamily="49" charset="0"/>
+              </a:rPr>
+              <a:t>(</a:t>
+            </a:r>
+            <a:r>
+              <a:rPr lang="pt-BR" sz="2000" dirty="0" err="1">
+                <a:latin typeface="Courier New" panose="02070309020205020404" pitchFamily="49" charset="0"/>
+                <a:cs typeface="Courier New" panose="02070309020205020404" pitchFamily="49" charset="0"/>
+              </a:rPr>
+              <a:t>indice</a:t>
+            </a:r>
+            <a:r>
+              <a:rPr lang="pt-BR" sz="2000" dirty="0" smtClean="0">
+                <a:latin typeface="Courier New" panose="02070309020205020404" pitchFamily="49" charset="0"/>
+                <a:cs typeface="Courier New" panose="02070309020205020404" pitchFamily="49" charset="0"/>
+              </a:rPr>
+              <a:t>)</a:t>
+            </a:r>
+          </a:p>
+          <a:p>
+            <a:endParaRPr lang="pt-BR" sz="2000" dirty="0">
+              <a:latin typeface="Courier New" panose="02070309020205020404" pitchFamily="49" charset="0"/>
+              <a:cs typeface="Courier New" panose="02070309020205020404" pitchFamily="49" charset="0"/>
+            </a:endParaRPr>
+          </a:p>
+          <a:p>
+            <a:r>
+              <a:rPr lang="pt-BR" sz="2000" dirty="0" smtClean="0">
+                <a:latin typeface="Courier New" panose="02070309020205020404" pitchFamily="49" charset="0"/>
+                <a:cs typeface="Courier New" panose="02070309020205020404" pitchFamily="49" charset="0"/>
+              </a:rPr>
+              <a:t>  --</a:t>
+            </a:r>
+            <a:r>
+              <a:rPr lang="pt-BR" sz="2000" dirty="0">
+                <a:latin typeface="Courier New" panose="02070309020205020404" pitchFamily="49" charset="0"/>
+                <a:cs typeface="Courier New" panose="02070309020205020404" pitchFamily="49" charset="0"/>
+              </a:rPr>
+              <a:t>verifica se tile direita </a:t>
+            </a:r>
+            <a:r>
+              <a:rPr lang="pt-BR" sz="2000" dirty="0" smtClean="0">
+                <a:latin typeface="Courier New" panose="02070309020205020404" pitchFamily="49" charset="0"/>
+                <a:cs typeface="Courier New" panose="02070309020205020404" pitchFamily="49" charset="0"/>
+              </a:rPr>
+              <a:t>está </a:t>
+            </a:r>
+            <a:r>
+              <a:rPr lang="pt-BR" sz="2000" dirty="0">
+                <a:latin typeface="Courier New" panose="02070309020205020404" pitchFamily="49" charset="0"/>
+                <a:cs typeface="Courier New" panose="02070309020205020404" pitchFamily="49" charset="0"/>
+              </a:rPr>
+              <a:t>vazia</a:t>
+            </a:r>
+          </a:p>
+          <a:p>
+            <a:r>
+              <a:rPr lang="pt-BR" sz="2000" dirty="0" smtClean="0">
+                <a:latin typeface="Courier New" panose="02070309020205020404" pitchFamily="49" charset="0"/>
+                <a:cs typeface="Courier New" panose="02070309020205020404" pitchFamily="49" charset="0"/>
+              </a:rPr>
+              <a:t>  </a:t>
+            </a:r>
+            <a:r>
+              <a:rPr lang="pt-BR" sz="2000" b="1" dirty="0" err="1" smtClean="0">
+                <a:solidFill>
+                  <a:schemeClr val="accent1"/>
+                </a:solidFill>
+                <a:latin typeface="Courier New" panose="02070309020205020404" pitchFamily="49" charset="0"/>
+                <a:cs typeface="Courier New" panose="02070309020205020404" pitchFamily="49" charset="0"/>
+              </a:rPr>
+              <a:t>if</a:t>
+            </a:r>
+            <a:r>
+              <a:rPr lang="pt-BR" sz="2000" dirty="0" smtClean="0">
+                <a:solidFill>
+                  <a:schemeClr val="accent1"/>
+                </a:solidFill>
+                <a:latin typeface="Courier New" panose="02070309020205020404" pitchFamily="49" charset="0"/>
+                <a:cs typeface="Courier New" panose="02070309020205020404" pitchFamily="49" charset="0"/>
+              </a:rPr>
+              <a:t> </a:t>
+            </a:r>
+            <a:r>
+              <a:rPr lang="pt-BR" sz="2000" dirty="0" err="1">
+                <a:latin typeface="Courier New" panose="02070309020205020404" pitchFamily="49" charset="0"/>
+                <a:cs typeface="Courier New" panose="02070309020205020404" pitchFamily="49" charset="0"/>
+              </a:rPr>
+              <a:t>indice</a:t>
+            </a:r>
+            <a:r>
+              <a:rPr lang="pt-BR" sz="2000" dirty="0">
+                <a:latin typeface="Courier New" panose="02070309020205020404" pitchFamily="49" charset="0"/>
+                <a:cs typeface="Courier New" panose="02070309020205020404" pitchFamily="49" charset="0"/>
+              </a:rPr>
+              <a:t> % dificuldade ~= </a:t>
+            </a:r>
+            <a:r>
+              <a:rPr lang="pt-BR" sz="2000" dirty="0">
+                <a:solidFill>
+                  <a:schemeClr val="accent2"/>
+                </a:solidFill>
+                <a:latin typeface="Courier New" panose="02070309020205020404" pitchFamily="49" charset="0"/>
+                <a:cs typeface="Courier New" panose="02070309020205020404" pitchFamily="49" charset="0"/>
+              </a:rPr>
+              <a:t>0</a:t>
+            </a:r>
+            <a:r>
+              <a:rPr lang="pt-BR" sz="2000" dirty="0">
+                <a:latin typeface="Courier New" panose="02070309020205020404" pitchFamily="49" charset="0"/>
+                <a:cs typeface="Courier New" panose="02070309020205020404" pitchFamily="49" charset="0"/>
+              </a:rPr>
+              <a:t> </a:t>
+            </a:r>
+            <a:r>
+              <a:rPr lang="pt-BR" sz="2000" b="1" dirty="0" err="1">
+                <a:solidFill>
+                  <a:schemeClr val="accent1"/>
+                </a:solidFill>
+                <a:latin typeface="Courier New" panose="02070309020205020404" pitchFamily="49" charset="0"/>
+                <a:cs typeface="Courier New" panose="02070309020205020404" pitchFamily="49" charset="0"/>
+              </a:rPr>
+              <a:t>then</a:t>
+            </a:r>
+            <a:endParaRPr lang="pt-BR" sz="2000" b="1" dirty="0">
+              <a:solidFill>
+                <a:schemeClr val="accent1"/>
+              </a:solidFill>
+              <a:latin typeface="Courier New" panose="02070309020205020404" pitchFamily="49" charset="0"/>
+              <a:cs typeface="Courier New" panose="02070309020205020404" pitchFamily="49" charset="0"/>
+            </a:endParaRPr>
+          </a:p>
+          <a:p>
+            <a:r>
+              <a:rPr lang="pt-BR" sz="2000" dirty="0" smtClean="0">
+                <a:latin typeface="Courier New" panose="02070309020205020404" pitchFamily="49" charset="0"/>
+                <a:cs typeface="Courier New" panose="02070309020205020404" pitchFamily="49" charset="0"/>
+              </a:rPr>
+              <a:t>    </a:t>
+            </a:r>
+            <a:r>
+              <a:rPr lang="pt-BR" sz="2000" b="1" dirty="0" err="1" smtClean="0">
+                <a:solidFill>
+                  <a:schemeClr val="accent1"/>
+                </a:solidFill>
+                <a:latin typeface="Courier New" panose="02070309020205020404" pitchFamily="49" charset="0"/>
+                <a:cs typeface="Courier New" panose="02070309020205020404" pitchFamily="49" charset="0"/>
+              </a:rPr>
+              <a:t>if</a:t>
+            </a:r>
+            <a:r>
+              <a:rPr lang="pt-BR" sz="2000" dirty="0" smtClean="0">
+                <a:solidFill>
+                  <a:schemeClr val="accent1"/>
+                </a:solidFill>
+                <a:latin typeface="Courier New" panose="02070309020205020404" pitchFamily="49" charset="0"/>
+                <a:cs typeface="Courier New" panose="02070309020205020404" pitchFamily="49" charset="0"/>
+              </a:rPr>
+              <a:t> </a:t>
+            </a:r>
+            <a:r>
+              <a:rPr lang="pt-BR" sz="2000" dirty="0">
+                <a:latin typeface="Courier New" panose="02070309020205020404" pitchFamily="49" charset="0"/>
+                <a:cs typeface="Courier New" panose="02070309020205020404" pitchFamily="49" charset="0"/>
+              </a:rPr>
+              <a:t>tiles[</a:t>
+            </a:r>
+            <a:r>
+              <a:rPr lang="pt-BR" sz="2000" dirty="0" err="1">
+                <a:latin typeface="Courier New" panose="02070309020205020404" pitchFamily="49" charset="0"/>
+                <a:cs typeface="Courier New" panose="02070309020205020404" pitchFamily="49" charset="0"/>
+              </a:rPr>
+              <a:t>indice</a:t>
+            </a:r>
+            <a:r>
+              <a:rPr lang="pt-BR" sz="2000" dirty="0">
+                <a:latin typeface="Courier New" panose="02070309020205020404" pitchFamily="49" charset="0"/>
+                <a:cs typeface="Courier New" panose="02070309020205020404" pitchFamily="49" charset="0"/>
+              </a:rPr>
+              <a:t> + </a:t>
+            </a:r>
+            <a:r>
+              <a:rPr lang="pt-BR" sz="2000" dirty="0">
+                <a:solidFill>
+                  <a:schemeClr val="accent2"/>
+                </a:solidFill>
+                <a:latin typeface="Courier New" panose="02070309020205020404" pitchFamily="49" charset="0"/>
+                <a:cs typeface="Courier New" panose="02070309020205020404" pitchFamily="49" charset="0"/>
+              </a:rPr>
+              <a:t>1</a:t>
+            </a:r>
+            <a:r>
+              <a:rPr lang="pt-BR" sz="2000" dirty="0">
+                <a:latin typeface="Courier New" panose="02070309020205020404" pitchFamily="49" charset="0"/>
+                <a:cs typeface="Courier New" panose="02070309020205020404" pitchFamily="49" charset="0"/>
+              </a:rPr>
+              <a:t>].</a:t>
+            </a:r>
+            <a:r>
+              <a:rPr lang="pt-BR" sz="2000" dirty="0" err="1">
+                <a:latin typeface="Courier New" panose="02070309020205020404" pitchFamily="49" charset="0"/>
+                <a:cs typeface="Courier New" panose="02070309020205020404" pitchFamily="49" charset="0"/>
+              </a:rPr>
+              <a:t>visivel</a:t>
+            </a:r>
+            <a:r>
+              <a:rPr lang="pt-BR" sz="2000" dirty="0">
+                <a:latin typeface="Courier New" panose="02070309020205020404" pitchFamily="49" charset="0"/>
+                <a:cs typeface="Courier New" panose="02070309020205020404" pitchFamily="49" charset="0"/>
+              </a:rPr>
+              <a:t> == false </a:t>
+            </a:r>
+            <a:r>
+              <a:rPr lang="pt-BR" sz="2000" b="1" dirty="0" err="1">
+                <a:solidFill>
+                  <a:schemeClr val="accent1"/>
+                </a:solidFill>
+                <a:latin typeface="Courier New" panose="02070309020205020404" pitchFamily="49" charset="0"/>
+                <a:cs typeface="Courier New" panose="02070309020205020404" pitchFamily="49" charset="0"/>
+              </a:rPr>
+              <a:t>then</a:t>
+            </a:r>
+            <a:endParaRPr lang="pt-BR" sz="2000" b="1" dirty="0">
+              <a:solidFill>
+                <a:schemeClr val="accent1"/>
+              </a:solidFill>
+              <a:latin typeface="Courier New" panose="02070309020205020404" pitchFamily="49" charset="0"/>
+              <a:cs typeface="Courier New" panose="02070309020205020404" pitchFamily="49" charset="0"/>
+            </a:endParaRPr>
+          </a:p>
+          <a:p>
+            <a:r>
+              <a:rPr lang="pt-BR" sz="2000" dirty="0" smtClean="0">
+                <a:latin typeface="Courier New" panose="02070309020205020404" pitchFamily="49" charset="0"/>
+                <a:cs typeface="Courier New" panose="02070309020205020404" pitchFamily="49" charset="0"/>
+              </a:rPr>
+              <a:t>      tiles[</a:t>
+            </a:r>
+            <a:r>
+              <a:rPr lang="pt-BR" sz="2000" dirty="0" err="1" smtClean="0">
+                <a:latin typeface="Courier New" panose="02070309020205020404" pitchFamily="49" charset="0"/>
+                <a:cs typeface="Courier New" panose="02070309020205020404" pitchFamily="49" charset="0"/>
+              </a:rPr>
+              <a:t>indice</a:t>
+            </a:r>
+            <a:r>
+              <a:rPr lang="pt-BR" sz="2000" dirty="0">
+                <a:latin typeface="Courier New" panose="02070309020205020404" pitchFamily="49" charset="0"/>
+                <a:cs typeface="Courier New" panose="02070309020205020404" pitchFamily="49" charset="0"/>
+              </a:rPr>
+              <a:t>], tiles[</a:t>
+            </a:r>
+            <a:r>
+              <a:rPr lang="pt-BR" sz="2000" dirty="0" err="1">
+                <a:latin typeface="Courier New" panose="02070309020205020404" pitchFamily="49" charset="0"/>
+                <a:cs typeface="Courier New" panose="02070309020205020404" pitchFamily="49" charset="0"/>
+              </a:rPr>
+              <a:t>indice</a:t>
+            </a:r>
+            <a:r>
+              <a:rPr lang="pt-BR" sz="2000" dirty="0">
+                <a:latin typeface="Courier New" panose="02070309020205020404" pitchFamily="49" charset="0"/>
+                <a:cs typeface="Courier New" panose="02070309020205020404" pitchFamily="49" charset="0"/>
+              </a:rPr>
+              <a:t> + </a:t>
+            </a:r>
+            <a:r>
+              <a:rPr lang="pt-BR" sz="2000" dirty="0">
+                <a:solidFill>
+                  <a:schemeClr val="accent2"/>
+                </a:solidFill>
+                <a:latin typeface="Courier New" panose="02070309020205020404" pitchFamily="49" charset="0"/>
+                <a:cs typeface="Courier New" panose="02070309020205020404" pitchFamily="49" charset="0"/>
+              </a:rPr>
+              <a:t>1</a:t>
+            </a:r>
+            <a:r>
+              <a:rPr lang="pt-BR" sz="2000" dirty="0">
+                <a:latin typeface="Courier New" panose="02070309020205020404" pitchFamily="49" charset="0"/>
+                <a:cs typeface="Courier New" panose="02070309020205020404" pitchFamily="49" charset="0"/>
+              </a:rPr>
+              <a:t>] = </a:t>
+            </a:r>
+            <a:r>
+              <a:rPr lang="pt-BR" sz="2000" dirty="0" smtClean="0">
+                <a:latin typeface="Courier New" panose="02070309020205020404" pitchFamily="49" charset="0"/>
+                <a:cs typeface="Courier New" panose="02070309020205020404" pitchFamily="49" charset="0"/>
+              </a:rPr>
+              <a:t>   </a:t>
+            </a:r>
+          </a:p>
+          <a:p>
+            <a:r>
+              <a:rPr lang="pt-BR" sz="2000" dirty="0">
+                <a:latin typeface="Courier New" panose="02070309020205020404" pitchFamily="49" charset="0"/>
+                <a:cs typeface="Courier New" panose="02070309020205020404" pitchFamily="49" charset="0"/>
+              </a:rPr>
+              <a:t> </a:t>
+            </a:r>
+            <a:r>
+              <a:rPr lang="pt-BR" sz="2000" dirty="0" smtClean="0">
+                <a:latin typeface="Courier New" panose="02070309020205020404" pitchFamily="49" charset="0"/>
+                <a:cs typeface="Courier New" panose="02070309020205020404" pitchFamily="49" charset="0"/>
+              </a:rPr>
+              <a:t>     tiles[</a:t>
+            </a:r>
+            <a:r>
+              <a:rPr lang="pt-BR" sz="2000" dirty="0" err="1" smtClean="0">
+                <a:latin typeface="Courier New" panose="02070309020205020404" pitchFamily="49" charset="0"/>
+                <a:cs typeface="Courier New" panose="02070309020205020404" pitchFamily="49" charset="0"/>
+              </a:rPr>
+              <a:t>indice</a:t>
+            </a:r>
+            <a:r>
+              <a:rPr lang="pt-BR" sz="2000" dirty="0" smtClean="0">
+                <a:latin typeface="Courier New" panose="02070309020205020404" pitchFamily="49" charset="0"/>
+                <a:cs typeface="Courier New" panose="02070309020205020404" pitchFamily="49" charset="0"/>
+              </a:rPr>
+              <a:t> </a:t>
+            </a:r>
+            <a:r>
+              <a:rPr lang="pt-BR" sz="2000" dirty="0">
+                <a:latin typeface="Courier New" panose="02070309020205020404" pitchFamily="49" charset="0"/>
+                <a:cs typeface="Courier New" panose="02070309020205020404" pitchFamily="49" charset="0"/>
+              </a:rPr>
+              <a:t>+ </a:t>
+            </a:r>
+            <a:r>
+              <a:rPr lang="pt-BR" sz="2000" dirty="0">
+                <a:solidFill>
+                  <a:schemeClr val="accent2"/>
+                </a:solidFill>
+                <a:latin typeface="Courier New" panose="02070309020205020404" pitchFamily="49" charset="0"/>
+                <a:cs typeface="Courier New" panose="02070309020205020404" pitchFamily="49" charset="0"/>
+              </a:rPr>
+              <a:t>1</a:t>
+            </a:r>
+            <a:r>
+              <a:rPr lang="pt-BR" sz="2000" dirty="0">
+                <a:latin typeface="Courier New" panose="02070309020205020404" pitchFamily="49" charset="0"/>
+                <a:cs typeface="Courier New" panose="02070309020205020404" pitchFamily="49" charset="0"/>
+              </a:rPr>
+              <a:t>], tiles[</a:t>
+            </a:r>
+            <a:r>
+              <a:rPr lang="pt-BR" sz="2000" dirty="0" err="1">
+                <a:latin typeface="Courier New" panose="02070309020205020404" pitchFamily="49" charset="0"/>
+                <a:cs typeface="Courier New" panose="02070309020205020404" pitchFamily="49" charset="0"/>
+              </a:rPr>
+              <a:t>indice</a:t>
+            </a:r>
+            <a:r>
+              <a:rPr lang="pt-BR" sz="2000" dirty="0">
+                <a:latin typeface="Courier New" panose="02070309020205020404" pitchFamily="49" charset="0"/>
+                <a:cs typeface="Courier New" panose="02070309020205020404" pitchFamily="49" charset="0"/>
+              </a:rPr>
+              <a:t>]</a:t>
+            </a:r>
+          </a:p>
+          <a:p>
+            <a:r>
+              <a:rPr lang="pt-BR" sz="2000" dirty="0" smtClean="0">
+                <a:latin typeface="Courier New" panose="02070309020205020404" pitchFamily="49" charset="0"/>
+                <a:cs typeface="Courier New" panose="02070309020205020404" pitchFamily="49" charset="0"/>
+              </a:rPr>
+              <a:t>    </a:t>
+            </a:r>
+            <a:r>
+              <a:rPr lang="pt-BR" sz="2000" b="1" dirty="0" err="1" smtClean="0">
+                <a:solidFill>
+                  <a:schemeClr val="accent1"/>
+                </a:solidFill>
+                <a:latin typeface="Courier New" panose="02070309020205020404" pitchFamily="49" charset="0"/>
+                <a:cs typeface="Courier New" panose="02070309020205020404" pitchFamily="49" charset="0"/>
+              </a:rPr>
+              <a:t>end</a:t>
+            </a:r>
+            <a:endParaRPr lang="pt-BR" sz="2000" b="1" dirty="0">
+              <a:solidFill>
+                <a:schemeClr val="accent1"/>
+              </a:solidFill>
+              <a:latin typeface="Courier New" panose="02070309020205020404" pitchFamily="49" charset="0"/>
+              <a:cs typeface="Courier New" panose="02070309020205020404" pitchFamily="49" charset="0"/>
+            </a:endParaRPr>
+          </a:p>
+          <a:p>
+            <a:r>
+              <a:rPr lang="pt-BR" sz="2000" dirty="0" smtClean="0">
+                <a:latin typeface="Courier New" panose="02070309020205020404" pitchFamily="49" charset="0"/>
+                <a:cs typeface="Courier New" panose="02070309020205020404" pitchFamily="49" charset="0"/>
+              </a:rPr>
+              <a:t>  </a:t>
+            </a:r>
+            <a:r>
+              <a:rPr lang="pt-BR" sz="2000" b="1" dirty="0" err="1" smtClean="0">
+                <a:solidFill>
+                  <a:schemeClr val="accent1"/>
+                </a:solidFill>
+                <a:latin typeface="Courier New" panose="02070309020205020404" pitchFamily="49" charset="0"/>
+                <a:cs typeface="Courier New" panose="02070309020205020404" pitchFamily="49" charset="0"/>
+              </a:rPr>
+              <a:t>end</a:t>
+            </a:r>
+            <a:endParaRPr lang="pt-BR" sz="2000" b="1" dirty="0" smtClean="0">
+              <a:solidFill>
+                <a:schemeClr val="accent1"/>
+              </a:solidFill>
+              <a:latin typeface="Courier New" panose="02070309020205020404" pitchFamily="49" charset="0"/>
+              <a:cs typeface="Courier New" panose="02070309020205020404" pitchFamily="49" charset="0"/>
+            </a:endParaRPr>
+          </a:p>
+          <a:p>
+            <a:endParaRPr lang="pt-BR" sz="2000" b="1" dirty="0">
+              <a:solidFill>
+                <a:schemeClr val="accent1"/>
+              </a:solidFill>
+              <a:latin typeface="Courier New" panose="02070309020205020404" pitchFamily="49" charset="0"/>
+              <a:cs typeface="Courier New" panose="02070309020205020404" pitchFamily="49" charset="0"/>
+            </a:endParaRPr>
+          </a:p>
+          <a:p>
+            <a:r>
+              <a:rPr lang="pt-BR" sz="2000" b="1" dirty="0" smtClean="0">
+                <a:solidFill>
+                  <a:schemeClr val="accent1"/>
+                </a:solidFill>
+                <a:latin typeface="Courier New" panose="02070309020205020404" pitchFamily="49" charset="0"/>
+                <a:cs typeface="Courier New" panose="02070309020205020404" pitchFamily="49" charset="0"/>
+              </a:rPr>
+              <a:t>  </a:t>
+            </a:r>
+            <a:r>
+              <a:rPr lang="pt-BR" sz="2000" dirty="0" smtClean="0">
+                <a:latin typeface="Courier New" panose="02070309020205020404" pitchFamily="49" charset="0"/>
+                <a:cs typeface="Courier New" panose="02070309020205020404" pitchFamily="49" charset="0"/>
+              </a:rPr>
+              <a:t>--tile esquerda:</a:t>
+            </a:r>
+          </a:p>
+          <a:p>
+            <a:r>
+              <a:rPr lang="pt-BR" sz="2000" b="1" dirty="0" smtClean="0">
+                <a:solidFill>
+                  <a:schemeClr val="accent1"/>
+                </a:solidFill>
+                <a:latin typeface="Courier New" panose="02070309020205020404" pitchFamily="49" charset="0"/>
+                <a:cs typeface="Courier New" panose="02070309020205020404" pitchFamily="49" charset="0"/>
+              </a:rPr>
+              <a:t>  </a:t>
+            </a:r>
+            <a:r>
+              <a:rPr lang="pt-BR" sz="2000" b="1" dirty="0" err="1" smtClean="0">
+                <a:solidFill>
+                  <a:schemeClr val="accent1"/>
+                </a:solidFill>
+                <a:latin typeface="Courier New" panose="02070309020205020404" pitchFamily="49" charset="0"/>
+                <a:cs typeface="Courier New" panose="02070309020205020404" pitchFamily="49" charset="0"/>
+              </a:rPr>
+              <a:t>if</a:t>
+            </a:r>
+            <a:r>
+              <a:rPr lang="pt-BR" sz="2000" b="1" dirty="0" smtClean="0">
+                <a:solidFill>
+                  <a:schemeClr val="accent1"/>
+                </a:solidFill>
+                <a:latin typeface="Courier New" panose="02070309020205020404" pitchFamily="49" charset="0"/>
+                <a:cs typeface="Courier New" panose="02070309020205020404" pitchFamily="49" charset="0"/>
+              </a:rPr>
+              <a:t> </a:t>
+            </a:r>
+            <a:r>
+              <a:rPr lang="pt-BR" sz="2000" dirty="0" smtClean="0">
+                <a:latin typeface="Courier New" panose="02070309020205020404" pitchFamily="49" charset="0"/>
+                <a:cs typeface="Courier New" panose="02070309020205020404" pitchFamily="49" charset="0"/>
+              </a:rPr>
+              <a:t>(</a:t>
+            </a:r>
+            <a:r>
+              <a:rPr lang="pt-BR" sz="2000" dirty="0" err="1" smtClean="0">
+                <a:latin typeface="Courier New" panose="02070309020205020404" pitchFamily="49" charset="0"/>
+                <a:cs typeface="Courier New" panose="02070309020205020404" pitchFamily="49" charset="0"/>
+              </a:rPr>
+              <a:t>indice</a:t>
+            </a:r>
+            <a:r>
+              <a:rPr lang="pt-BR" sz="2000" dirty="0" smtClean="0">
+                <a:latin typeface="Courier New" panose="02070309020205020404" pitchFamily="49" charset="0"/>
+                <a:cs typeface="Courier New" panose="02070309020205020404" pitchFamily="49" charset="0"/>
+              </a:rPr>
+              <a:t> – 1)</a:t>
+            </a:r>
+            <a:r>
+              <a:rPr lang="pt-BR" sz="2000" dirty="0">
+                <a:latin typeface="Courier New" panose="02070309020205020404" pitchFamily="49" charset="0"/>
+                <a:cs typeface="Courier New" panose="02070309020205020404" pitchFamily="49" charset="0"/>
+              </a:rPr>
+              <a:t> % dificuldade ~= </a:t>
+            </a:r>
+            <a:r>
+              <a:rPr lang="pt-BR" sz="2000" dirty="0">
+                <a:solidFill>
+                  <a:schemeClr val="accent2"/>
+                </a:solidFill>
+                <a:latin typeface="Courier New" panose="02070309020205020404" pitchFamily="49" charset="0"/>
+                <a:cs typeface="Courier New" panose="02070309020205020404" pitchFamily="49" charset="0"/>
+              </a:rPr>
+              <a:t>0</a:t>
+            </a:r>
+            <a:r>
+              <a:rPr lang="pt-BR" sz="2000" dirty="0">
+                <a:latin typeface="Courier New" panose="02070309020205020404" pitchFamily="49" charset="0"/>
+                <a:cs typeface="Courier New" panose="02070309020205020404" pitchFamily="49" charset="0"/>
+              </a:rPr>
+              <a:t> </a:t>
+            </a:r>
+            <a:r>
+              <a:rPr lang="pt-BR" sz="2000" b="1" dirty="0" err="1" smtClean="0">
+                <a:solidFill>
+                  <a:schemeClr val="accent1"/>
+                </a:solidFill>
+                <a:latin typeface="Courier New" panose="02070309020205020404" pitchFamily="49" charset="0"/>
+                <a:cs typeface="Courier New" panose="02070309020205020404" pitchFamily="49" charset="0"/>
+              </a:rPr>
+              <a:t>then</a:t>
+            </a:r>
+            <a:endParaRPr lang="pt-BR" sz="2000" dirty="0" smtClean="0">
+              <a:latin typeface="Courier New" panose="02070309020205020404" pitchFamily="49" charset="0"/>
+              <a:cs typeface="Courier New" panose="02070309020205020404" pitchFamily="49" charset="0"/>
+            </a:endParaRPr>
+          </a:p>
+          <a:p>
+            <a:endParaRPr lang="pt-BR" sz="2000" b="1" dirty="0" smtClean="0">
+              <a:solidFill>
+                <a:schemeClr val="accent1"/>
+              </a:solidFill>
+              <a:latin typeface="Courier New" panose="02070309020205020404" pitchFamily="49" charset="0"/>
+              <a:cs typeface="Courier New" panose="02070309020205020404" pitchFamily="49" charset="0"/>
+            </a:endParaRPr>
+          </a:p>
+          <a:p>
+            <a:r>
+              <a:rPr lang="pt-BR" sz="2000" b="1" dirty="0" smtClean="0">
+                <a:solidFill>
+                  <a:schemeClr val="accent1"/>
+                </a:solidFill>
+                <a:latin typeface="Courier New" panose="02070309020205020404" pitchFamily="49" charset="0"/>
+                <a:cs typeface="Courier New" panose="02070309020205020404" pitchFamily="49" charset="0"/>
+              </a:rPr>
+              <a:t>  </a:t>
+            </a:r>
+            <a:r>
+              <a:rPr lang="pt-BR" sz="2000" dirty="0">
+                <a:latin typeface="Courier New" panose="02070309020205020404" pitchFamily="49" charset="0"/>
+                <a:cs typeface="Courier New" panose="02070309020205020404" pitchFamily="49" charset="0"/>
+              </a:rPr>
+              <a:t>--tile </a:t>
+            </a:r>
+            <a:r>
+              <a:rPr lang="pt-BR" sz="2000" dirty="0" smtClean="0">
+                <a:latin typeface="Courier New" panose="02070309020205020404" pitchFamily="49" charset="0"/>
+                <a:cs typeface="Courier New" panose="02070309020205020404" pitchFamily="49" charset="0"/>
+              </a:rPr>
+              <a:t>superior:</a:t>
+            </a:r>
+          </a:p>
+          <a:p>
+            <a:r>
+              <a:rPr lang="pt-BR" sz="2000" dirty="0" smtClean="0">
+                <a:latin typeface="Courier New" panose="02070309020205020404" pitchFamily="49" charset="0"/>
+                <a:cs typeface="Courier New" panose="02070309020205020404" pitchFamily="49" charset="0"/>
+              </a:rPr>
+              <a:t>  </a:t>
+            </a:r>
+            <a:r>
+              <a:rPr lang="pt-BR" sz="2000" b="1" dirty="0" err="1" smtClean="0">
+                <a:solidFill>
+                  <a:schemeClr val="accent1"/>
+                </a:solidFill>
+                <a:latin typeface="Courier New" panose="02070309020205020404" pitchFamily="49" charset="0"/>
+                <a:cs typeface="Courier New" panose="02070309020205020404" pitchFamily="49" charset="0"/>
+              </a:rPr>
+              <a:t>if</a:t>
+            </a:r>
+            <a:r>
+              <a:rPr lang="pt-BR" sz="2000" b="1" dirty="0" smtClean="0">
+                <a:solidFill>
+                  <a:schemeClr val="accent1"/>
+                </a:solidFill>
+                <a:latin typeface="Courier New" panose="02070309020205020404" pitchFamily="49" charset="0"/>
+                <a:cs typeface="Courier New" panose="02070309020205020404" pitchFamily="49" charset="0"/>
+              </a:rPr>
+              <a:t> </a:t>
+            </a:r>
+            <a:r>
+              <a:rPr lang="pt-BR" sz="2000" dirty="0" smtClean="0">
+                <a:latin typeface="Courier New" panose="02070309020205020404" pitchFamily="49" charset="0"/>
+                <a:cs typeface="Courier New" panose="02070309020205020404" pitchFamily="49" charset="0"/>
+              </a:rPr>
+              <a:t>(</a:t>
+            </a:r>
+            <a:r>
+              <a:rPr lang="pt-BR" sz="2000" dirty="0" err="1" smtClean="0">
+                <a:latin typeface="Courier New" panose="02070309020205020404" pitchFamily="49" charset="0"/>
+                <a:cs typeface="Courier New" panose="02070309020205020404" pitchFamily="49" charset="0"/>
+              </a:rPr>
+              <a:t>indice</a:t>
+            </a:r>
+            <a:r>
+              <a:rPr lang="pt-BR" sz="2000" dirty="0" smtClean="0">
+                <a:latin typeface="Courier New" panose="02070309020205020404" pitchFamily="49" charset="0"/>
+                <a:cs typeface="Courier New" panose="02070309020205020404" pitchFamily="49" charset="0"/>
+              </a:rPr>
+              <a:t> </a:t>
+            </a:r>
+            <a:r>
+              <a:rPr lang="pt-BR" sz="2000" dirty="0">
+                <a:latin typeface="Courier New" panose="02070309020205020404" pitchFamily="49" charset="0"/>
+                <a:cs typeface="Courier New" panose="02070309020205020404" pitchFamily="49" charset="0"/>
+              </a:rPr>
+              <a:t>– </a:t>
+            </a:r>
+            <a:r>
+              <a:rPr lang="pt-BR" sz="2000" dirty="0" smtClean="0">
+                <a:latin typeface="Courier New" panose="02070309020205020404" pitchFamily="49" charset="0"/>
+                <a:cs typeface="Courier New" panose="02070309020205020404" pitchFamily="49" charset="0"/>
+              </a:rPr>
+              <a:t>dificuldade) &gt; </a:t>
+            </a:r>
+            <a:r>
+              <a:rPr lang="pt-BR" sz="2000" dirty="0" smtClean="0">
+                <a:solidFill>
+                  <a:schemeClr val="accent2"/>
+                </a:solidFill>
+                <a:latin typeface="Courier New" panose="02070309020205020404" pitchFamily="49" charset="0"/>
+                <a:cs typeface="Courier New" panose="02070309020205020404" pitchFamily="49" charset="0"/>
+              </a:rPr>
+              <a:t>0</a:t>
+            </a:r>
+          </a:p>
+          <a:p>
+            <a:endParaRPr lang="pt-BR" sz="2000" b="1" dirty="0" smtClean="0">
+              <a:solidFill>
+                <a:schemeClr val="accent1"/>
+              </a:solidFill>
+              <a:latin typeface="Courier New" panose="02070309020205020404" pitchFamily="49" charset="0"/>
+              <a:cs typeface="Courier New" panose="02070309020205020404" pitchFamily="49" charset="0"/>
+            </a:endParaRPr>
+          </a:p>
+          <a:p>
+            <a:r>
+              <a:rPr lang="pt-BR" sz="2000" b="1" dirty="0" smtClean="0">
+                <a:solidFill>
+                  <a:schemeClr val="accent1"/>
+                </a:solidFill>
+                <a:latin typeface="Courier New" panose="02070309020205020404" pitchFamily="49" charset="0"/>
+                <a:cs typeface="Courier New" panose="02070309020205020404" pitchFamily="49" charset="0"/>
+              </a:rPr>
+              <a:t>  </a:t>
+            </a:r>
+            <a:r>
+              <a:rPr lang="pt-BR" sz="2000" dirty="0">
+                <a:latin typeface="Courier New" panose="02070309020205020404" pitchFamily="49" charset="0"/>
+                <a:cs typeface="Courier New" panose="02070309020205020404" pitchFamily="49" charset="0"/>
+              </a:rPr>
+              <a:t>--tile </a:t>
+            </a:r>
+            <a:r>
+              <a:rPr lang="pt-BR" sz="2000" dirty="0" smtClean="0">
+                <a:latin typeface="Courier New" panose="02070309020205020404" pitchFamily="49" charset="0"/>
+                <a:cs typeface="Courier New" panose="02070309020205020404" pitchFamily="49" charset="0"/>
+              </a:rPr>
+              <a:t>inferior:</a:t>
+            </a:r>
+            <a:endParaRPr lang="pt-BR" sz="2000" b="1" dirty="0" smtClean="0">
+              <a:solidFill>
+                <a:schemeClr val="accent1"/>
+              </a:solidFill>
+              <a:latin typeface="Courier New" panose="02070309020205020404" pitchFamily="49" charset="0"/>
+              <a:cs typeface="Courier New" panose="02070309020205020404" pitchFamily="49" charset="0"/>
+            </a:endParaRPr>
+          </a:p>
+          <a:p>
+            <a:r>
+              <a:rPr lang="pt-BR" sz="2000" b="1" dirty="0" smtClean="0">
+                <a:solidFill>
+                  <a:schemeClr val="accent1"/>
+                </a:solidFill>
+                <a:latin typeface="Courier New" panose="02070309020205020404" pitchFamily="49" charset="0"/>
+                <a:cs typeface="Courier New" panose="02070309020205020404" pitchFamily="49" charset="0"/>
+              </a:rPr>
+              <a:t>  </a:t>
+            </a:r>
+            <a:r>
+              <a:rPr lang="pt-BR" sz="2000" b="1" dirty="0" err="1" smtClean="0">
+                <a:solidFill>
+                  <a:schemeClr val="accent1"/>
+                </a:solidFill>
+                <a:latin typeface="Courier New" panose="02070309020205020404" pitchFamily="49" charset="0"/>
+                <a:cs typeface="Courier New" panose="02070309020205020404" pitchFamily="49" charset="0"/>
+              </a:rPr>
+              <a:t>if</a:t>
+            </a:r>
+            <a:r>
+              <a:rPr lang="pt-BR" sz="2000" b="1" dirty="0" smtClean="0">
+                <a:solidFill>
+                  <a:schemeClr val="accent1"/>
+                </a:solidFill>
+                <a:latin typeface="Courier New" panose="02070309020205020404" pitchFamily="49" charset="0"/>
+                <a:cs typeface="Courier New" panose="02070309020205020404" pitchFamily="49" charset="0"/>
+              </a:rPr>
+              <a:t> </a:t>
+            </a:r>
+            <a:r>
+              <a:rPr lang="pt-BR" sz="2000" dirty="0" smtClean="0">
+                <a:latin typeface="Courier New" panose="02070309020205020404" pitchFamily="49" charset="0"/>
+                <a:cs typeface="Courier New" panose="02070309020205020404" pitchFamily="49" charset="0"/>
+              </a:rPr>
+              <a:t>(</a:t>
+            </a:r>
+            <a:r>
+              <a:rPr lang="pt-BR" sz="2000" dirty="0" err="1" smtClean="0">
+                <a:latin typeface="Courier New" panose="02070309020205020404" pitchFamily="49" charset="0"/>
+                <a:cs typeface="Courier New" panose="02070309020205020404" pitchFamily="49" charset="0"/>
+              </a:rPr>
+              <a:t>indice</a:t>
+            </a:r>
+            <a:r>
+              <a:rPr lang="pt-BR" sz="2000" dirty="0" smtClean="0">
+                <a:latin typeface="Courier New" panose="02070309020205020404" pitchFamily="49" charset="0"/>
+                <a:cs typeface="Courier New" panose="02070309020205020404" pitchFamily="49" charset="0"/>
+              </a:rPr>
+              <a:t> + </a:t>
+            </a:r>
+            <a:r>
+              <a:rPr lang="pt-BR" sz="2000" dirty="0">
+                <a:latin typeface="Courier New" panose="02070309020205020404" pitchFamily="49" charset="0"/>
+                <a:cs typeface="Courier New" panose="02070309020205020404" pitchFamily="49" charset="0"/>
+              </a:rPr>
+              <a:t>dificuldade) &lt;= (</a:t>
+            </a:r>
+            <a:r>
+              <a:rPr lang="pt-BR" sz="2000" dirty="0" err="1" smtClean="0">
+                <a:latin typeface="Courier New" panose="02070309020205020404" pitchFamily="49" charset="0"/>
+                <a:cs typeface="Courier New" panose="02070309020205020404" pitchFamily="49" charset="0"/>
+              </a:rPr>
+              <a:t>dif</a:t>
+            </a:r>
+            <a:r>
+              <a:rPr lang="pt-BR" sz="2000" dirty="0" smtClean="0">
+                <a:latin typeface="Courier New" panose="02070309020205020404" pitchFamily="49" charset="0"/>
+                <a:cs typeface="Courier New" panose="02070309020205020404" pitchFamily="49" charset="0"/>
+              </a:rPr>
+              <a:t> </a:t>
+            </a:r>
+            <a:r>
+              <a:rPr lang="pt-BR" sz="2000" dirty="0">
+                <a:latin typeface="Courier New" panose="02070309020205020404" pitchFamily="49" charset="0"/>
+                <a:cs typeface="Courier New" panose="02070309020205020404" pitchFamily="49" charset="0"/>
+              </a:rPr>
+              <a:t>* </a:t>
+            </a:r>
+            <a:r>
+              <a:rPr lang="pt-BR" sz="2000" dirty="0" err="1" smtClean="0">
+                <a:latin typeface="Courier New" panose="02070309020205020404" pitchFamily="49" charset="0"/>
+                <a:cs typeface="Courier New" panose="02070309020205020404" pitchFamily="49" charset="0"/>
+              </a:rPr>
+              <a:t>dif</a:t>
+            </a:r>
+            <a:r>
+              <a:rPr lang="pt-BR" sz="2000" dirty="0" smtClean="0">
+                <a:latin typeface="Courier New" panose="02070309020205020404" pitchFamily="49" charset="0"/>
+                <a:cs typeface="Courier New" panose="02070309020205020404" pitchFamily="49" charset="0"/>
+              </a:rPr>
+              <a:t>)</a:t>
+            </a:r>
+            <a:endParaRPr lang="pt-BR" sz="2000" b="1" dirty="0">
+              <a:solidFill>
+                <a:schemeClr val="accent1"/>
+              </a:solidFill>
+              <a:latin typeface="Courier New" panose="02070309020205020404" pitchFamily="49" charset="0"/>
+              <a:cs typeface="Courier New" panose="02070309020205020404" pitchFamily="49" charset="0"/>
+            </a:endParaRPr>
+          </a:p>
+          <a:p>
+            <a:endParaRPr lang="pt-BR" sz="2000" b="1" dirty="0" smtClean="0">
+              <a:solidFill>
+                <a:schemeClr val="accent1"/>
+              </a:solidFill>
+              <a:latin typeface="Courier New" panose="02070309020205020404" pitchFamily="49" charset="0"/>
+              <a:cs typeface="Courier New" panose="02070309020205020404" pitchFamily="49" charset="0"/>
+            </a:endParaRPr>
+          </a:p>
+          <a:p>
+            <a:r>
+              <a:rPr lang="pt-BR" sz="2000" b="1" dirty="0" err="1" smtClean="0">
+                <a:solidFill>
+                  <a:schemeClr val="accent1"/>
+                </a:solidFill>
+                <a:latin typeface="Courier New" panose="02070309020205020404" pitchFamily="49" charset="0"/>
+                <a:cs typeface="Courier New" panose="02070309020205020404" pitchFamily="49" charset="0"/>
+              </a:rPr>
+              <a:t>end</a:t>
+            </a:r>
+            <a:endParaRPr lang="pt-BR" b="1" dirty="0">
+              <a:solidFill>
+                <a:schemeClr val="accent1"/>
+              </a:solidFill>
+            </a:endParaRPr>
+          </a:p>
+        </p:txBody>
+      </p:sp>
     </p:spTree>
     <p:extLst>
       <p:ext uri="{BB962C8B-B14F-4D97-AF65-F5344CB8AC3E}">
@@ -10200,15 +12630,6 @@
 </file>
 
 <file path=customXml/item2.xml><?xml version="1.0" encoding="utf-8"?>
-<?mso-contentType ?>
-<FormTemplates xmlns="http://schemas.microsoft.com/sharepoint/v3/contenttype/forms">
-  <Display>DocumentLibraryForm</Display>
-  <Edit>AssetEditForm</Edit>
-  <New>DocumentLibraryForm</New>
-</FormTemplates>
-</file>
-
-<file path=customXml/item3.xml><?xml version="1.0" encoding="utf-8"?>
 <p:properties xmlns:p="http://schemas.microsoft.com/office/2006/metadata/properties" xmlns:xsi="http://www.w3.org/2001/XMLSchema-instance" xmlns:pc="http://schemas.microsoft.com/office/infopath/2007/PartnerControls">
   <documentManagement>
     <LocPublishedLinkedAssetsLookup xmlns="4873beb7-5857-4685-be1f-d57550cc96cc" xsi:nil="true"/>
@@ -10344,6 +12765,15 @@
 </p:properties>
 </file>
 
+<file path=customXml/item3.xml><?xml version="1.0" encoding="utf-8"?>
+<?mso-contentType ?>
+<FormTemplates xmlns="http://schemas.microsoft.com/sharepoint/v3/contenttype/forms">
+  <Display>DocumentLibraryForm</Display>
+  <Edit>AssetEditForm</Edit>
+  <New>DocumentLibraryForm</New>
+</FormTemplates>
+</file>
+
 <file path=customXml/itemProps1.xml><?xml version="1.0" encoding="utf-8"?>
 <ds:datastoreItem xmlns:ds="http://schemas.openxmlformats.org/officeDocument/2006/customXml" ds:itemID="{A09BF4D4-EF60-4196-BFC3-9462D607978C}">
   <ds:schemaRefs>
@@ -10363,14 +12793,6 @@
 </file>
 
 <file path=customXml/itemProps2.xml><?xml version="1.0" encoding="utf-8"?>
-<ds:datastoreItem xmlns:ds="http://schemas.openxmlformats.org/officeDocument/2006/customXml" ds:itemID="{3836F65B-1B07-41EE-A0E8-BC6EF3855225}">
-  <ds:schemaRefs>
-    <ds:schemaRef ds:uri="http://schemas.microsoft.com/sharepoint/v3/contenttype/forms"/>
-  </ds:schemaRefs>
-</ds:datastoreItem>
-</file>
-
-<file path=customXml/itemProps3.xml><?xml version="1.0" encoding="utf-8"?>
 <ds:datastoreItem xmlns:ds="http://schemas.openxmlformats.org/officeDocument/2006/customXml" ds:itemID="{60C67BEE-D13F-4BD2-98A5-34D8A0977F68}">
   <ds:schemaRefs>
     <ds:schemaRef ds:uri="4873beb7-5857-4685-be1f-d57550cc96cc"/>
@@ -10384,4 +12806,12 @@
     <ds:schemaRef ds:uri="http://purl.org/dc/dcmitype/"/>
   </ds:schemaRefs>
 </ds:datastoreItem>
+</file>
+
+<file path=customXml/itemProps3.xml><?xml version="1.0" encoding="utf-8"?>
+<ds:datastoreItem xmlns:ds="http://schemas.openxmlformats.org/officeDocument/2006/customXml" ds:itemID="{3836F65B-1B07-41EE-A0E8-BC6EF3855225}">
+  <ds:schemaRefs>
+    <ds:schemaRef ds:uri="http://schemas.microsoft.com/sharepoint/v3/contenttype/forms"/>
+  </ds:schemaRefs>
+</ds:datastoreItem>
 </file>
</xml_diff>